<commit_message>
Presentation 'Fork-Join' - 3d commit
</commit_message>
<xml_diff>
--- a/resources/Presentation_Fork-Join.pptx
+++ b/resources/Presentation_Fork-Join.pptx
@@ -7,17 +7,19 @@
   <p:sldIdLst>
     <p:sldId id="257" r:id="rId2"/>
     <p:sldId id="270" r:id="rId3"/>
-    <p:sldId id="260" r:id="rId4"/>
-    <p:sldId id="272" r:id="rId5"/>
-    <p:sldId id="268" r:id="rId6"/>
-    <p:sldId id="275" r:id="rId7"/>
-    <p:sldId id="276" r:id="rId8"/>
-    <p:sldId id="277" r:id="rId9"/>
-    <p:sldId id="273" r:id="rId10"/>
+    <p:sldId id="272" r:id="rId4"/>
+    <p:sldId id="268" r:id="rId5"/>
+    <p:sldId id="275" r:id="rId6"/>
+    <p:sldId id="276" r:id="rId7"/>
+    <p:sldId id="277" r:id="rId8"/>
+    <p:sldId id="273" r:id="rId9"/>
+    <p:sldId id="279" r:id="rId10"/>
     <p:sldId id="278" r:id="rId11"/>
-    <p:sldId id="274" r:id="rId12"/>
-    <p:sldId id="271" r:id="rId13"/>
-    <p:sldId id="269" r:id="rId14"/>
+    <p:sldId id="280" r:id="rId12"/>
+    <p:sldId id="281" r:id="rId13"/>
+    <p:sldId id="274" r:id="rId14"/>
+    <p:sldId id="271" r:id="rId15"/>
+    <p:sldId id="269" r:id="rId16"/>
   </p:sldIdLst>
   <p:sldSz cx="12192000" cy="6858000"/>
   <p:notesSz cx="6858000" cy="9144000"/>
@@ -143,14 +145,6 @@
 <file path=ppt/slideLayouts/slideLayout1.xml><?xml version="1.0" encoding="utf-8"?>
 <p:sldLayout xmlns:a="http://schemas.openxmlformats.org/drawingml/2006/main" xmlns:r="http://schemas.openxmlformats.org/officeDocument/2006/relationships" xmlns:p="http://schemas.openxmlformats.org/presentationml/2006/main" type="title" preserve="1">
   <p:cSld name="Титульный слайд">
-    <p:bg>
-      <p:bgPr>
-        <a:solidFill>
-          <a:schemeClr val="accent2"/>
-        </a:solidFill>
-        <a:effectLst/>
-      </p:bgPr>
-    </p:bg>
     <p:spTree>
       <p:nvGrpSpPr>
         <p:cNvPr id="1" name=""/>
@@ -887,14 +881,6 @@
 <file path=ppt/slideLayouts/slideLayout3.xml><?xml version="1.0" encoding="utf-8"?>
 <p:sldLayout xmlns:a="http://schemas.openxmlformats.org/drawingml/2006/main" xmlns:r="http://schemas.openxmlformats.org/officeDocument/2006/relationships" xmlns:p="http://schemas.openxmlformats.org/presentationml/2006/main" type="secHead" preserve="1">
   <p:cSld name="Заголовок раздела">
-    <p:bg>
-      <p:bgPr>
-        <a:solidFill>
-          <a:schemeClr val="accent1"/>
-        </a:solidFill>
-        <a:effectLst/>
-      </p:bgPr>
-    </p:bg>
     <p:spTree>
       <p:nvGrpSpPr>
         <p:cNvPr id="1" name=""/>
@@ -2714,9 +2700,7 @@
     <p:bg>
       <p:bgPr>
         <a:solidFill>
-          <a:schemeClr val="bg1">
-            <a:lumMod val="95000"/>
-          </a:schemeClr>
+          <a:schemeClr val="bg1"/>
         </a:solidFill>
         <a:effectLst/>
       </p:bgPr>
@@ -3595,17 +3579,7 @@
                 <a:latin typeface="Times New Roman" panose="02020603050405020304" pitchFamily="18" charset="0"/>
                 <a:cs typeface="Times New Roman" panose="02020603050405020304" pitchFamily="18" charset="0"/>
               </a:rPr>
-              <a:t>Методы </a:t>
-            </a:r>
-            <a:r>
-              <a:rPr lang="en-US" sz="3200" b="1" dirty="0" smtClean="0">
-                <a:solidFill>
-                  <a:srgbClr val="002060"/>
-                </a:solidFill>
-                <a:latin typeface="Times New Roman" panose="02020603050405020304" pitchFamily="18" charset="0"/>
-                <a:cs typeface="Times New Roman" panose="02020603050405020304" pitchFamily="18" charset="0"/>
-              </a:rPr>
-              <a:t>fork() </a:t>
+              <a:t>Основные м</a:t>
             </a:r>
             <a:r>
               <a:rPr lang="ru-RU" sz="3200" b="1" dirty="0" smtClean="0">
@@ -3615,17 +3589,7 @@
                 <a:latin typeface="Times New Roman" panose="02020603050405020304" pitchFamily="18" charset="0"/>
                 <a:cs typeface="Times New Roman" panose="02020603050405020304" pitchFamily="18" charset="0"/>
               </a:rPr>
-              <a:t>и </a:t>
-            </a:r>
-            <a:r>
-              <a:rPr lang="en-US" sz="3200" b="1" dirty="0" smtClean="0">
-                <a:solidFill>
-                  <a:srgbClr val="002060"/>
-                </a:solidFill>
-                <a:latin typeface="Times New Roman" panose="02020603050405020304" pitchFamily="18" charset="0"/>
-                <a:cs typeface="Times New Roman" panose="02020603050405020304" pitchFamily="18" charset="0"/>
-              </a:rPr>
-              <a:t>join()</a:t>
+              <a:t>етоды </a:t>
             </a:r>
             <a:endParaRPr lang="ru-RU" sz="3200" b="1" dirty="0">
               <a:solidFill>
@@ -3682,7 +3646,14 @@
                 <a:latin typeface="Times New Roman" panose="02020603050405020304" pitchFamily="18" charset="0"/>
                 <a:cs typeface="Times New Roman" panose="02020603050405020304" pitchFamily="18" charset="0"/>
               </a:rPr>
-              <a:t> – отправляет задачу в пул, но не запускает её выполнение</a:t>
+              <a:t> – отправляет задачу в пул, но не запускает её </a:t>
+            </a:r>
+            <a:r>
+              <a:rPr lang="ru-RU" sz="2800" dirty="0" smtClean="0">
+                <a:latin typeface="Times New Roman" panose="02020603050405020304" pitchFamily="18" charset="0"/>
+                <a:cs typeface="Times New Roman" panose="02020603050405020304" pitchFamily="18" charset="0"/>
+              </a:rPr>
+              <a:t>выполнение</a:t>
             </a:r>
             <a:r>
               <a:rPr lang="en-US" sz="2800" dirty="0" smtClean="0">
@@ -4055,7 +4026,27 @@
                 <a:latin typeface="Times New Roman" panose="02020603050405020304" pitchFamily="18" charset="0"/>
                 <a:cs typeface="Times New Roman" panose="02020603050405020304" pitchFamily="18" charset="0"/>
               </a:rPr>
-              <a:t>Заключение</a:t>
+              <a:t>Выбор </a:t>
+            </a:r>
+            <a:r>
+              <a:rPr lang="en-US" sz="3200" b="1" dirty="0" smtClean="0">
+                <a:solidFill>
+                  <a:srgbClr val="002060"/>
+                </a:solidFill>
+                <a:latin typeface="Times New Roman" panose="02020603050405020304" pitchFamily="18" charset="0"/>
+                <a:cs typeface="Times New Roman" panose="02020603050405020304" pitchFamily="18" charset="0"/>
+              </a:rPr>
+              <a:t>threshold-</a:t>
+            </a:r>
+            <a:r>
+              <a:rPr lang="ru-RU" sz="3200" b="1" dirty="0" smtClean="0">
+                <a:solidFill>
+                  <a:srgbClr val="002060"/>
+                </a:solidFill>
+                <a:latin typeface="Times New Roman" panose="02020603050405020304" pitchFamily="18" charset="0"/>
+                <a:cs typeface="Times New Roman" panose="02020603050405020304" pitchFamily="18" charset="0"/>
+              </a:rPr>
+              <a:t>а</a:t>
             </a:r>
             <a:endParaRPr lang="ru-RU" sz="3200" b="1" dirty="0">
               <a:solidFill>
@@ -4076,7 +4067,7 @@
         <p:spPr>
           <a:xfrm>
             <a:off x="334962" y="584200"/>
-            <a:ext cx="11522075" cy="5016758"/>
+            <a:ext cx="11522075" cy="5509200"/>
           </a:xfrm>
           <a:prstGeom prst="rect">
             <a:avLst/>
@@ -4090,69 +4081,69 @@
           <a:lstStyle/>
           <a:p>
             <a:r>
+              <a:rPr lang="en-US" sz="3200" b="1" dirty="0" smtClean="0">
+                <a:latin typeface="Times New Roman" panose="02020603050405020304" pitchFamily="18" charset="0"/>
+                <a:cs typeface="Times New Roman" panose="02020603050405020304" pitchFamily="18" charset="0"/>
+              </a:rPr>
+              <a:t>Threshold</a:t>
+            </a:r>
+            <a:r>
+              <a:rPr lang="en-US" sz="3200" dirty="0" smtClean="0">
+                <a:latin typeface="Times New Roman" panose="02020603050405020304" pitchFamily="18" charset="0"/>
+                <a:cs typeface="Times New Roman" panose="02020603050405020304" pitchFamily="18" charset="0"/>
+              </a:rPr>
+              <a:t> – </a:t>
+            </a:r>
+            <a:r>
               <a:rPr lang="ru-RU" sz="3200" dirty="0" smtClean="0">
                 <a:latin typeface="Times New Roman" panose="02020603050405020304" pitchFamily="18" charset="0"/>
                 <a:cs typeface="Times New Roman" panose="02020603050405020304" pitchFamily="18" charset="0"/>
               </a:rPr>
-              <a:t>Использование структуры </a:t>
-            </a:r>
-            <a:r>
-              <a:rPr lang="en-US" sz="3200" dirty="0" smtClean="0">
-                <a:latin typeface="Times New Roman" panose="02020603050405020304" pitchFamily="18" charset="0"/>
-                <a:cs typeface="Times New Roman" panose="02020603050405020304" pitchFamily="18" charset="0"/>
-              </a:rPr>
-              <a:t>fork/join </a:t>
+              <a:t>это ширина</a:t>
+            </a:r>
+            <a:r>
+              <a:rPr lang="ru-RU" sz="3200" dirty="0">
+                <a:latin typeface="Times New Roman" panose="02020603050405020304" pitchFamily="18" charset="0"/>
+                <a:cs typeface="Times New Roman" panose="02020603050405020304" pitchFamily="18" charset="0"/>
+              </a:rPr>
+              <a:t> </a:t>
             </a:r>
             <a:r>
               <a:rPr lang="ru-RU" sz="3200" dirty="0" smtClean="0">
                 <a:latin typeface="Times New Roman" panose="02020603050405020304" pitchFamily="18" charset="0"/>
                 <a:cs typeface="Times New Roman" panose="02020603050405020304" pitchFamily="18" charset="0"/>
               </a:rPr>
-              <a:t>может ускорить обработку больших задач, но для достижения этого результата необходимо следовать некоторым рекомендациям:</a:t>
-            </a:r>
-          </a:p>
-          <a:p>
-            <a:pPr marL="342900" indent="-342900">
+              <a:t>(порог) дробления задачи.</a:t>
+            </a:r>
+          </a:p>
+          <a:p>
+            <a:pPr marL="457200" indent="-457200">
               <a:buFontTx/>
               <a:buChar char="-"/>
             </a:pPr>
             <a:r>
-              <a:rPr lang="ru-RU" sz="3200" dirty="0">
-                <a:latin typeface="Times New Roman" panose="02020603050405020304" pitchFamily="18" charset="0"/>
-                <a:cs typeface="Times New Roman" panose="02020603050405020304" pitchFamily="18" charset="0"/>
-              </a:rPr>
-              <a:t>и</a:t>
-            </a:r>
-            <a:r>
               <a:rPr lang="ru-RU" sz="3200" dirty="0" smtClean="0">
                 <a:latin typeface="Times New Roman" panose="02020603050405020304" pitchFamily="18" charset="0"/>
                 <a:cs typeface="Times New Roman" panose="02020603050405020304" pitchFamily="18" charset="0"/>
               </a:rPr>
-              <a:t>спользовать как можно меньше пулов потоков (лучше один пул потоков на приложение или систему)</a:t>
-            </a:r>
-          </a:p>
-          <a:p>
-            <a:pPr marL="342900" indent="-342900">
+              <a:t>Если слишком маленький, то возрастут инфраструктурные задачи.</a:t>
+            </a:r>
+          </a:p>
+          <a:p>
+            <a:pPr marL="457200" indent="-457200">
               <a:buFontTx/>
               <a:buChar char="-"/>
             </a:pPr>
             <a:r>
-              <a:rPr lang="ru-RU" sz="3200" dirty="0">
-                <a:latin typeface="Times New Roman" panose="02020603050405020304" pitchFamily="18" charset="0"/>
-                <a:cs typeface="Times New Roman" panose="02020603050405020304" pitchFamily="18" charset="0"/>
-              </a:rPr>
-              <a:t>и</a:t>
-            </a:r>
-            <a:r>
               <a:rPr lang="ru-RU" sz="3200" dirty="0" smtClean="0">
                 <a:latin typeface="Times New Roman" panose="02020603050405020304" pitchFamily="18" charset="0"/>
                 <a:cs typeface="Times New Roman" panose="02020603050405020304" pitchFamily="18" charset="0"/>
               </a:rPr>
-              <a:t>спользовать общий пул потоков, если не требуется особая настройка</a:t>
-            </a:r>
-          </a:p>
-          <a:p>
-            <a:pPr marL="342900" indent="-342900">
+              <a:t>Если слишком большой, то будет мало параллелизма.</a:t>
+            </a:r>
+          </a:p>
+          <a:p>
+            <a:pPr marL="457200" indent="-457200">
               <a:buFontTx/>
               <a:buChar char="-"/>
             </a:pPr>
@@ -4161,14 +4152,37 @@
                 <a:latin typeface="Times New Roman" panose="02020603050405020304" pitchFamily="18" charset="0"/>
                 <a:cs typeface="Times New Roman" panose="02020603050405020304" pitchFamily="18" charset="0"/>
               </a:rPr>
-              <a:t>использовать разумный порог для разделения </a:t>
+              <a:t>Банальная интуиция подсказывает следующее решение:</a:t>
+            </a:r>
+          </a:p>
+          <a:p>
+            <a:r>
+              <a:rPr lang="ru-RU" sz="3200" dirty="0">
+                <a:latin typeface="Times New Roman" panose="02020603050405020304" pitchFamily="18" charset="0"/>
+                <a:cs typeface="Times New Roman" panose="02020603050405020304" pitchFamily="18" charset="0"/>
+              </a:rPr>
+              <a:t>	</a:t>
+            </a:r>
+            <a:r>
+              <a:rPr lang="ru-RU" sz="3200" dirty="0" smtClean="0">
+                <a:latin typeface="Times New Roman" panose="02020603050405020304" pitchFamily="18" charset="0"/>
+                <a:cs typeface="Times New Roman" panose="02020603050405020304" pitchFamily="18" charset="0"/>
+              </a:rPr>
+              <a:t>			</a:t>
+            </a:r>
+            <a:r>
+              <a:rPr lang="en-US" sz="3200" dirty="0" smtClean="0">
+                <a:latin typeface="Times New Roman" panose="02020603050405020304" pitchFamily="18" charset="0"/>
+                <a:cs typeface="Times New Roman" panose="02020603050405020304" pitchFamily="18" charset="0"/>
+              </a:rPr>
+              <a:t>T = N / </a:t>
             </a:r>
             <a:r>
               <a:rPr lang="en-US" sz="3200" dirty="0" err="1" smtClean="0">
                 <a:latin typeface="Times New Roman" panose="02020603050405020304" pitchFamily="18" charset="0"/>
                 <a:cs typeface="Times New Roman" panose="02020603050405020304" pitchFamily="18" charset="0"/>
               </a:rPr>
-              <a:t>ForkJoinTask</a:t>
+              <a:t>Ncpu</a:t>
             </a:r>
             <a:r>
               <a:rPr lang="en-US" sz="3200" dirty="0" smtClean="0">
@@ -4182,49 +4196,85 @@
                 <a:latin typeface="Times New Roman" panose="02020603050405020304" pitchFamily="18" charset="0"/>
                 <a:cs typeface="Times New Roman" panose="02020603050405020304" pitchFamily="18" charset="0"/>
               </a:rPr>
-              <a:t>на подзадачи</a:t>
-            </a:r>
-          </a:p>
-          <a:p>
-            <a:pPr marL="342900" indent="-342900">
-              <a:buFontTx/>
-              <a:buChar char="-"/>
-            </a:pPr>
+              <a:t>,</a:t>
+            </a:r>
+          </a:p>
+          <a:p>
+            <a:r>
+              <a:rPr lang="ru-RU" sz="3200" dirty="0" smtClean="0">
+                <a:latin typeface="Times New Roman" panose="02020603050405020304" pitchFamily="18" charset="0"/>
+                <a:cs typeface="Times New Roman" panose="02020603050405020304" pitchFamily="18" charset="0"/>
+              </a:rPr>
+              <a:t> 	где </a:t>
+            </a:r>
+            <a:r>
+              <a:rPr lang="en-US" sz="3200" dirty="0" smtClean="0">
+                <a:latin typeface="Times New Roman" panose="02020603050405020304" pitchFamily="18" charset="0"/>
+                <a:cs typeface="Times New Roman" panose="02020603050405020304" pitchFamily="18" charset="0"/>
+              </a:rPr>
+              <a:t>N – </a:t>
+            </a:r>
+            <a:r>
+              <a:rPr lang="ru-RU" sz="3200" dirty="0" smtClean="0">
+                <a:latin typeface="Times New Roman" panose="02020603050405020304" pitchFamily="18" charset="0"/>
+                <a:cs typeface="Times New Roman" panose="02020603050405020304" pitchFamily="18" charset="0"/>
+              </a:rPr>
+              <a:t>размер задачи, </a:t>
+            </a:r>
+            <a:r>
+              <a:rPr lang="en-US" sz="3200" dirty="0" err="1" smtClean="0">
+                <a:latin typeface="Times New Roman" panose="02020603050405020304" pitchFamily="18" charset="0"/>
+                <a:cs typeface="Times New Roman" panose="02020603050405020304" pitchFamily="18" charset="0"/>
+              </a:rPr>
+              <a:t>Ncpu</a:t>
+            </a:r>
+            <a:r>
+              <a:rPr lang="en-US" sz="3200" dirty="0" smtClean="0">
+                <a:latin typeface="Times New Roman" panose="02020603050405020304" pitchFamily="18" charset="0"/>
+                <a:cs typeface="Times New Roman" panose="02020603050405020304" pitchFamily="18" charset="0"/>
+              </a:rPr>
+              <a:t> – </a:t>
+            </a:r>
+            <a:r>
+              <a:rPr lang="ru-RU" sz="3200" dirty="0" smtClean="0">
+                <a:latin typeface="Times New Roman" panose="02020603050405020304" pitchFamily="18" charset="0"/>
+                <a:cs typeface="Times New Roman" panose="02020603050405020304" pitchFamily="18" charset="0"/>
+              </a:rPr>
+              <a:t>доступный параллелизм.</a:t>
+            </a:r>
+          </a:p>
+          <a:p>
+            <a:endParaRPr lang="ru-RU" sz="3200" dirty="0" smtClean="0">
+              <a:latin typeface="Times New Roman" panose="02020603050405020304" pitchFamily="18" charset="0"/>
+              <a:cs typeface="Times New Roman" panose="02020603050405020304" pitchFamily="18" charset="0"/>
+            </a:endParaRPr>
+          </a:p>
+          <a:p>
             <a:r>
               <a:rPr lang="ru-RU" sz="3200" dirty="0">
                 <a:latin typeface="Times New Roman" panose="02020603050405020304" pitchFamily="18" charset="0"/>
                 <a:cs typeface="Times New Roman" panose="02020603050405020304" pitchFamily="18" charset="0"/>
               </a:rPr>
-              <a:t>и</a:t>
+              <a:t>	</a:t>
             </a:r>
             <a:r>
               <a:rPr lang="ru-RU" sz="3200" dirty="0" smtClean="0">
                 <a:latin typeface="Times New Roman" panose="02020603050405020304" pitchFamily="18" charset="0"/>
                 <a:cs typeface="Times New Roman" panose="02020603050405020304" pitchFamily="18" charset="0"/>
               </a:rPr>
-              <a:t>збегать любых блокировок в ваших </a:t>
-            </a:r>
-            <a:r>
-              <a:rPr lang="en-US" sz="3200" dirty="0" err="1" smtClean="0">
-                <a:latin typeface="Times New Roman" panose="02020603050405020304" pitchFamily="18" charset="0"/>
-                <a:cs typeface="Times New Roman" panose="02020603050405020304" pitchFamily="18" charset="0"/>
-              </a:rPr>
-              <a:t>ForkJoinTask</a:t>
-            </a:r>
-            <a:r>
-              <a:rPr lang="ru-RU" sz="3200" dirty="0" smtClean="0">
-                <a:latin typeface="Times New Roman" panose="02020603050405020304" pitchFamily="18" charset="0"/>
-                <a:cs typeface="Times New Roman" panose="02020603050405020304" pitchFamily="18" charset="0"/>
-              </a:rPr>
-              <a:t>-ах</a:t>
-            </a:r>
+              <a:t>В теории работает хорошо, но на практике возможны проблемы, т.к. задачи могут занимать разное время и балансировка будет страдать.</a:t>
+            </a:r>
+            <a:endParaRPr lang="ru-RU" sz="3200" dirty="0" smtClean="0">
+              <a:latin typeface="Times New Roman" panose="02020603050405020304" pitchFamily="18" charset="0"/>
+              <a:cs typeface="Times New Roman" panose="02020603050405020304" pitchFamily="18" charset="0"/>
+            </a:endParaRPr>
           </a:p>
         </p:txBody>
       </p:sp>
     </p:spTree>
     <p:extLst>
       <p:ext uri="{BB962C8B-B14F-4D97-AF65-F5344CB8AC3E}">
-        <p14:creationId xmlns:p14="http://schemas.microsoft.com/office/powerpoint/2010/main" val="709801214"/>
+        <p14:creationId xmlns:p14="http://schemas.microsoft.com/office/powerpoint/2010/main" val="3404484919"/>
       </p:ext>
     </p:extLst>
   </p:cSld>
@@ -4348,6 +4398,673 @@
                 <a:latin typeface="Times New Roman" panose="02020603050405020304" pitchFamily="18" charset="0"/>
                 <a:cs typeface="Times New Roman" panose="02020603050405020304" pitchFamily="18" charset="0"/>
               </a:rPr>
+              <a:t>Выбор </a:t>
+            </a:r>
+            <a:r>
+              <a:rPr lang="en-US" sz="3200" b="1" dirty="0" smtClean="0">
+                <a:solidFill>
+                  <a:srgbClr val="002060"/>
+                </a:solidFill>
+                <a:latin typeface="Times New Roman" panose="02020603050405020304" pitchFamily="18" charset="0"/>
+                <a:cs typeface="Times New Roman" panose="02020603050405020304" pitchFamily="18" charset="0"/>
+              </a:rPr>
+              <a:t>threshold-</a:t>
+            </a:r>
+            <a:r>
+              <a:rPr lang="ru-RU" sz="3200" b="1" dirty="0" smtClean="0">
+                <a:solidFill>
+                  <a:srgbClr val="002060"/>
+                </a:solidFill>
+                <a:latin typeface="Times New Roman" panose="02020603050405020304" pitchFamily="18" charset="0"/>
+                <a:cs typeface="Times New Roman" panose="02020603050405020304" pitchFamily="18" charset="0"/>
+              </a:rPr>
+              <a:t>а</a:t>
+            </a:r>
+            <a:endParaRPr lang="ru-RU" sz="3200" b="1" dirty="0">
+              <a:solidFill>
+                <a:srgbClr val="002060"/>
+              </a:solidFill>
+              <a:latin typeface="Times New Roman" panose="02020603050405020304" pitchFamily="18" charset="0"/>
+              <a:cs typeface="Times New Roman" panose="02020603050405020304" pitchFamily="18" charset="0"/>
+            </a:endParaRPr>
+          </a:p>
+        </p:txBody>
+      </p:sp>
+      <p:sp>
+        <p:nvSpPr>
+          <p:cNvPr id="7" name="TextBox 6"/>
+          <p:cNvSpPr txBox="1"/>
+          <p:nvPr/>
+        </p:nvSpPr>
+        <p:spPr>
+          <a:xfrm>
+            <a:off x="334962" y="584200"/>
+            <a:ext cx="11522075" cy="4524315"/>
+          </a:xfrm>
+          <a:prstGeom prst="rect">
+            <a:avLst/>
+          </a:prstGeom>
+          <a:noFill/>
+        </p:spPr>
+        <p:txBody>
+          <a:bodyPr wrap="square" rtlCol="0">
+            <a:spAutoFit/>
+          </a:bodyPr>
+          <a:lstStyle/>
+          <a:p>
+            <a:r>
+              <a:rPr lang="ru-RU" sz="3200" dirty="0" smtClean="0">
+                <a:latin typeface="Times New Roman" panose="02020603050405020304" pitchFamily="18" charset="0"/>
+                <a:cs typeface="Times New Roman" panose="02020603050405020304" pitchFamily="18" charset="0"/>
+              </a:rPr>
+              <a:t> Более продвинутый расчёт имеет следующий вид: </a:t>
+            </a:r>
+            <a:r>
+              <a:rPr lang="ru-RU" sz="3200" dirty="0">
+                <a:latin typeface="Times New Roman" panose="02020603050405020304" pitchFamily="18" charset="0"/>
+                <a:cs typeface="Times New Roman" panose="02020603050405020304" pitchFamily="18" charset="0"/>
+              </a:rPr>
+              <a:t>	</a:t>
+            </a:r>
+            <a:r>
+              <a:rPr lang="ru-RU" sz="3200" dirty="0" smtClean="0">
+                <a:latin typeface="Times New Roman" panose="02020603050405020304" pitchFamily="18" charset="0"/>
+                <a:cs typeface="Times New Roman" panose="02020603050405020304" pitchFamily="18" charset="0"/>
+              </a:rPr>
+              <a:t>			</a:t>
+            </a:r>
+            <a:r>
+              <a:rPr lang="en-US" sz="3200" dirty="0" smtClean="0">
+                <a:latin typeface="Times New Roman" panose="02020603050405020304" pitchFamily="18" charset="0"/>
+                <a:cs typeface="Times New Roman" panose="02020603050405020304" pitchFamily="18" charset="0"/>
+              </a:rPr>
+              <a:t>T = N / </a:t>
+            </a:r>
+            <a:r>
+              <a:rPr lang="ru-RU" sz="3200" dirty="0" smtClean="0">
+                <a:latin typeface="Times New Roman" panose="02020603050405020304" pitchFamily="18" charset="0"/>
+                <a:cs typeface="Times New Roman" panose="02020603050405020304" pitchFamily="18" charset="0"/>
+              </a:rPr>
+              <a:t>(</a:t>
+            </a:r>
+            <a:r>
+              <a:rPr lang="en-US" sz="3200" dirty="0" smtClean="0">
+                <a:latin typeface="Times New Roman" panose="02020603050405020304" pitchFamily="18" charset="0"/>
+                <a:cs typeface="Times New Roman" panose="02020603050405020304" pitchFamily="18" charset="0"/>
+              </a:rPr>
+              <a:t>LF * </a:t>
+            </a:r>
+            <a:r>
+              <a:rPr lang="en-US" sz="3200" dirty="0" err="1" smtClean="0">
+                <a:latin typeface="Times New Roman" panose="02020603050405020304" pitchFamily="18" charset="0"/>
+                <a:cs typeface="Times New Roman" panose="02020603050405020304" pitchFamily="18" charset="0"/>
+              </a:rPr>
+              <a:t>Ncpu</a:t>
+            </a:r>
+            <a:r>
+              <a:rPr lang="ru-RU" sz="3200" dirty="0">
+                <a:latin typeface="Times New Roman" panose="02020603050405020304" pitchFamily="18" charset="0"/>
+                <a:cs typeface="Times New Roman" panose="02020603050405020304" pitchFamily="18" charset="0"/>
+              </a:rPr>
+              <a:t>)</a:t>
+            </a:r>
+            <a:r>
+              <a:rPr lang="en-US" sz="3200" dirty="0" smtClean="0">
+                <a:latin typeface="Times New Roman" panose="02020603050405020304" pitchFamily="18" charset="0"/>
+                <a:cs typeface="Times New Roman" panose="02020603050405020304" pitchFamily="18" charset="0"/>
+              </a:rPr>
+              <a:t> </a:t>
+            </a:r>
+            <a:r>
+              <a:rPr lang="ru-RU" sz="3200" dirty="0" smtClean="0">
+                <a:latin typeface="Times New Roman" panose="02020603050405020304" pitchFamily="18" charset="0"/>
+                <a:cs typeface="Times New Roman" panose="02020603050405020304" pitchFamily="18" charset="0"/>
+              </a:rPr>
+              <a:t>,где </a:t>
+            </a:r>
+          </a:p>
+          <a:p>
+            <a:r>
+              <a:rPr lang="ru-RU" sz="3200" dirty="0">
+                <a:latin typeface="Times New Roman" panose="02020603050405020304" pitchFamily="18" charset="0"/>
+                <a:cs typeface="Times New Roman" panose="02020603050405020304" pitchFamily="18" charset="0"/>
+              </a:rPr>
+              <a:t>	</a:t>
+            </a:r>
+            <a:r>
+              <a:rPr lang="en-US" sz="3200" dirty="0" smtClean="0">
+                <a:latin typeface="Times New Roman" panose="02020603050405020304" pitchFamily="18" charset="0"/>
+                <a:cs typeface="Times New Roman" panose="02020603050405020304" pitchFamily="18" charset="0"/>
+              </a:rPr>
+              <a:t>N – </a:t>
+            </a:r>
+            <a:r>
+              <a:rPr lang="ru-RU" sz="3200" dirty="0" smtClean="0">
+                <a:latin typeface="Times New Roman" panose="02020603050405020304" pitchFamily="18" charset="0"/>
+                <a:cs typeface="Times New Roman" panose="02020603050405020304" pitchFamily="18" charset="0"/>
+              </a:rPr>
+              <a:t>размер задачи, </a:t>
+            </a:r>
+          </a:p>
+          <a:p>
+            <a:r>
+              <a:rPr lang="ru-RU" sz="3200" dirty="0">
+                <a:latin typeface="Times New Roman" panose="02020603050405020304" pitchFamily="18" charset="0"/>
+                <a:cs typeface="Times New Roman" panose="02020603050405020304" pitchFamily="18" charset="0"/>
+              </a:rPr>
+              <a:t>	</a:t>
+            </a:r>
+            <a:r>
+              <a:rPr lang="en-US" sz="3200" dirty="0" err="1" smtClean="0">
+                <a:latin typeface="Times New Roman" panose="02020603050405020304" pitchFamily="18" charset="0"/>
+                <a:cs typeface="Times New Roman" panose="02020603050405020304" pitchFamily="18" charset="0"/>
+              </a:rPr>
+              <a:t>Ncpu</a:t>
+            </a:r>
+            <a:r>
+              <a:rPr lang="en-US" sz="3200" dirty="0" smtClean="0">
+                <a:latin typeface="Times New Roman" panose="02020603050405020304" pitchFamily="18" charset="0"/>
+                <a:cs typeface="Times New Roman" panose="02020603050405020304" pitchFamily="18" charset="0"/>
+              </a:rPr>
+              <a:t> – </a:t>
+            </a:r>
+            <a:r>
+              <a:rPr lang="ru-RU" sz="3200" dirty="0" smtClean="0">
+                <a:latin typeface="Times New Roman" panose="02020603050405020304" pitchFamily="18" charset="0"/>
+                <a:cs typeface="Times New Roman" panose="02020603050405020304" pitchFamily="18" charset="0"/>
+              </a:rPr>
+              <a:t>доступный параллелизм,</a:t>
+            </a:r>
+          </a:p>
+          <a:p>
+            <a:r>
+              <a:rPr lang="ru-RU" sz="3200" dirty="0">
+                <a:latin typeface="Times New Roman" panose="02020603050405020304" pitchFamily="18" charset="0"/>
+                <a:cs typeface="Times New Roman" panose="02020603050405020304" pitchFamily="18" charset="0"/>
+              </a:rPr>
+              <a:t>	</a:t>
+            </a:r>
+            <a:r>
+              <a:rPr lang="en-US" sz="3200" dirty="0" smtClean="0">
+                <a:latin typeface="Times New Roman" panose="02020603050405020304" pitchFamily="18" charset="0"/>
+                <a:cs typeface="Times New Roman" panose="02020603050405020304" pitchFamily="18" charset="0"/>
+              </a:rPr>
+              <a:t>LF – load factor (</a:t>
+            </a:r>
+            <a:r>
+              <a:rPr lang="ru-RU" sz="3200" dirty="0" smtClean="0">
+                <a:latin typeface="Times New Roman" panose="02020603050405020304" pitchFamily="18" charset="0"/>
+                <a:cs typeface="Times New Roman" panose="02020603050405020304" pitchFamily="18" charset="0"/>
+              </a:rPr>
+              <a:t>коэффициент нагрузки, примерно </a:t>
+            </a:r>
+            <a:r>
+              <a:rPr lang="en-US" sz="3200" dirty="0" smtClean="0">
+                <a:latin typeface="Times New Roman" panose="02020603050405020304" pitchFamily="18" charset="0"/>
+                <a:cs typeface="Times New Roman" panose="02020603050405020304" pitchFamily="18" charset="0"/>
+              </a:rPr>
+              <a:t>	</a:t>
+            </a:r>
+            <a:r>
+              <a:rPr lang="ru-RU" sz="3200" dirty="0" smtClean="0">
+                <a:latin typeface="Times New Roman" panose="02020603050405020304" pitchFamily="18" charset="0"/>
+                <a:cs typeface="Times New Roman" panose="02020603050405020304" pitchFamily="18" charset="0"/>
+              </a:rPr>
+              <a:t>соответствует количеству задач на поток</a:t>
+            </a:r>
+            <a:r>
+              <a:rPr lang="en-US" sz="3200" dirty="0" smtClean="0">
+                <a:latin typeface="Times New Roman" panose="02020603050405020304" pitchFamily="18" charset="0"/>
+                <a:cs typeface="Times New Roman" panose="02020603050405020304" pitchFamily="18" charset="0"/>
+              </a:rPr>
+              <a:t>)</a:t>
+            </a:r>
+            <a:r>
+              <a:rPr lang="ru-RU" sz="3200" dirty="0" smtClean="0">
+                <a:latin typeface="Times New Roman" panose="02020603050405020304" pitchFamily="18" charset="0"/>
+                <a:cs typeface="Times New Roman" panose="02020603050405020304" pitchFamily="18" charset="0"/>
+              </a:rPr>
+              <a:t>.</a:t>
+            </a:r>
+          </a:p>
+          <a:p>
+            <a:r>
+              <a:rPr lang="en-US" sz="3200" dirty="0" smtClean="0">
+                <a:latin typeface="Times New Roman" panose="02020603050405020304" pitchFamily="18" charset="0"/>
+                <a:cs typeface="Times New Roman" panose="02020603050405020304" pitchFamily="18" charset="0"/>
+              </a:rPr>
+              <a:t>Load Factor </a:t>
+            </a:r>
+            <a:r>
+              <a:rPr lang="ru-RU" sz="3200" dirty="0" smtClean="0">
+                <a:latin typeface="Times New Roman" panose="02020603050405020304" pitchFamily="18" charset="0"/>
+                <a:cs typeface="Times New Roman" panose="02020603050405020304" pitchFamily="18" charset="0"/>
+              </a:rPr>
+              <a:t>менее влияет на скорость, он отвязан от размеров задачи и количества процессоров, труднее ошибиться с выбором, обычно принимают от 10 до 100.</a:t>
+            </a:r>
+          </a:p>
+        </p:txBody>
+      </p:sp>
+    </p:spTree>
+    <p:extLst>
+      <p:ext uri="{BB962C8B-B14F-4D97-AF65-F5344CB8AC3E}">
+        <p14:creationId xmlns:p14="http://schemas.microsoft.com/office/powerpoint/2010/main" val="1862764294"/>
+      </p:ext>
+    </p:extLst>
+  </p:cSld>
+  <p:clrMapOvr>
+    <a:masterClrMapping/>
+  </p:clrMapOvr>
+  <p:timing>
+    <p:tnLst>
+      <p:par>
+        <p:cTn id="1" dur="indefinite" restart="never" nodeType="tmRoot"/>
+      </p:par>
+    </p:tnLst>
+  </p:timing>
+</p:sld>
+</file>
+
+<file path=ppt/slides/slide13.xml><?xml version="1.0" encoding="utf-8"?>
+<p:sld xmlns:a="http://schemas.openxmlformats.org/drawingml/2006/main" xmlns:r="http://schemas.openxmlformats.org/officeDocument/2006/relationships" xmlns:p="http://schemas.openxmlformats.org/presentationml/2006/main">
+  <p:cSld>
+    <p:spTree>
+      <p:nvGrpSpPr>
+        <p:cNvPr id="1" name=""/>
+        <p:cNvGrpSpPr/>
+        <p:nvPr/>
+      </p:nvGrpSpPr>
+      <p:grpSpPr>
+        <a:xfrm>
+          <a:off x="0" y="0"/>
+          <a:ext cx="0" cy="0"/>
+          <a:chOff x="0" y="0"/>
+          <a:chExt cx="0" cy="0"/>
+        </a:xfrm>
+      </p:grpSpPr>
+      <p:sp>
+        <p:nvSpPr>
+          <p:cNvPr id="5" name="TextBox 4"/>
+          <p:cNvSpPr txBox="1"/>
+          <p:nvPr/>
+        </p:nvSpPr>
+        <p:spPr>
+          <a:xfrm>
+            <a:off x="1" y="6273225"/>
+            <a:ext cx="12191999" cy="584775"/>
+          </a:xfrm>
+          <a:prstGeom prst="rect">
+            <a:avLst/>
+          </a:prstGeom>
+        </p:spPr>
+        <p:style>
+          <a:lnRef idx="1">
+            <a:schemeClr val="accent2"/>
+          </a:lnRef>
+          <a:fillRef idx="2">
+            <a:schemeClr val="accent2"/>
+          </a:fillRef>
+          <a:effectRef idx="1">
+            <a:schemeClr val="accent2"/>
+          </a:effectRef>
+          <a:fontRef idx="minor">
+            <a:schemeClr val="dk1"/>
+          </a:fontRef>
+        </p:style>
+        <p:txBody>
+          <a:bodyPr wrap="square" rtlCol="0">
+            <a:spAutoFit/>
+          </a:bodyPr>
+          <a:lstStyle/>
+          <a:p>
+            <a:pPr algn="ctr"/>
+            <a:endParaRPr lang="ru-RU" sz="3200" dirty="0">
+              <a:solidFill>
+                <a:schemeClr val="bg1"/>
+              </a:solidFill>
+              <a:latin typeface="Times New Roman" panose="02020603050405020304" pitchFamily="18" charset="0"/>
+              <a:cs typeface="Times New Roman" panose="02020603050405020304" pitchFamily="18" charset="0"/>
+            </a:endParaRPr>
+          </a:p>
+        </p:txBody>
+      </p:sp>
+      <p:sp>
+        <p:nvSpPr>
+          <p:cNvPr id="8" name="TextBox 7"/>
+          <p:cNvSpPr txBox="1"/>
+          <p:nvPr/>
+        </p:nvSpPr>
+        <p:spPr>
+          <a:xfrm>
+            <a:off x="0" y="-575"/>
+            <a:ext cx="12191999" cy="584775"/>
+          </a:xfrm>
+          <a:prstGeom prst="rect">
+            <a:avLst/>
+          </a:prstGeom>
+        </p:spPr>
+        <p:style>
+          <a:lnRef idx="1">
+            <a:schemeClr val="accent2"/>
+          </a:lnRef>
+          <a:fillRef idx="2">
+            <a:schemeClr val="accent2"/>
+          </a:fillRef>
+          <a:effectRef idx="1">
+            <a:schemeClr val="accent2"/>
+          </a:effectRef>
+          <a:fontRef idx="minor">
+            <a:schemeClr val="dk1"/>
+          </a:fontRef>
+        </p:style>
+        <p:txBody>
+          <a:bodyPr wrap="square" rtlCol="0">
+            <a:spAutoFit/>
+          </a:bodyPr>
+          <a:lstStyle/>
+          <a:p>
+            <a:pPr algn="ctr"/>
+            <a:r>
+              <a:rPr lang="ru-RU" sz="3200" b="1" dirty="0" smtClean="0">
+                <a:solidFill>
+                  <a:srgbClr val="002060"/>
+                </a:solidFill>
+                <a:latin typeface="Times New Roman" panose="02020603050405020304" pitchFamily="18" charset="0"/>
+                <a:cs typeface="Times New Roman" panose="02020603050405020304" pitchFamily="18" charset="0"/>
+              </a:rPr>
+              <a:t>Заключение</a:t>
+            </a:r>
+            <a:endParaRPr lang="ru-RU" sz="3200" b="1" dirty="0">
+              <a:solidFill>
+                <a:srgbClr val="002060"/>
+              </a:solidFill>
+              <a:latin typeface="Times New Roman" panose="02020603050405020304" pitchFamily="18" charset="0"/>
+              <a:cs typeface="Times New Roman" panose="02020603050405020304" pitchFamily="18" charset="0"/>
+            </a:endParaRPr>
+          </a:p>
+        </p:txBody>
+      </p:sp>
+      <p:sp>
+        <p:nvSpPr>
+          <p:cNvPr id="7" name="TextBox 6"/>
+          <p:cNvSpPr txBox="1"/>
+          <p:nvPr/>
+        </p:nvSpPr>
+        <p:spPr>
+          <a:xfrm>
+            <a:off x="334962" y="584200"/>
+            <a:ext cx="11522075" cy="5016758"/>
+          </a:xfrm>
+          <a:prstGeom prst="rect">
+            <a:avLst/>
+          </a:prstGeom>
+          <a:noFill/>
+        </p:spPr>
+        <p:txBody>
+          <a:bodyPr wrap="square" rtlCol="0">
+            <a:spAutoFit/>
+          </a:bodyPr>
+          <a:lstStyle/>
+          <a:p>
+            <a:r>
+              <a:rPr lang="ru-RU" sz="3200" dirty="0" smtClean="0">
+                <a:latin typeface="Times New Roman" panose="02020603050405020304" pitchFamily="18" charset="0"/>
+                <a:cs typeface="Times New Roman" panose="02020603050405020304" pitchFamily="18" charset="0"/>
+              </a:rPr>
+              <a:t>Использование структуры </a:t>
+            </a:r>
+            <a:r>
+              <a:rPr lang="en-US" sz="3200" dirty="0" smtClean="0">
+                <a:latin typeface="Times New Roman" panose="02020603050405020304" pitchFamily="18" charset="0"/>
+                <a:cs typeface="Times New Roman" panose="02020603050405020304" pitchFamily="18" charset="0"/>
+              </a:rPr>
+              <a:t>fork/join </a:t>
+            </a:r>
+            <a:r>
+              <a:rPr lang="ru-RU" sz="3200" dirty="0" smtClean="0">
+                <a:latin typeface="Times New Roman" panose="02020603050405020304" pitchFamily="18" charset="0"/>
+                <a:cs typeface="Times New Roman" panose="02020603050405020304" pitchFamily="18" charset="0"/>
+              </a:rPr>
+              <a:t>может ускорить обработку больших задач, но для достижения этого результата необходимо следовать некоторым рекомендациям:</a:t>
+            </a:r>
+          </a:p>
+          <a:p>
+            <a:pPr marL="342900" indent="-342900">
+              <a:buFontTx/>
+              <a:buChar char="-"/>
+            </a:pPr>
+            <a:r>
+              <a:rPr lang="ru-RU" sz="3200" dirty="0">
+                <a:latin typeface="Times New Roman" panose="02020603050405020304" pitchFamily="18" charset="0"/>
+                <a:cs typeface="Times New Roman" panose="02020603050405020304" pitchFamily="18" charset="0"/>
+              </a:rPr>
+              <a:t>и</a:t>
+            </a:r>
+            <a:r>
+              <a:rPr lang="ru-RU" sz="3200" dirty="0" smtClean="0">
+                <a:latin typeface="Times New Roman" panose="02020603050405020304" pitchFamily="18" charset="0"/>
+                <a:cs typeface="Times New Roman" panose="02020603050405020304" pitchFamily="18" charset="0"/>
+              </a:rPr>
+              <a:t>спользовать как можно меньше пулов потоков (лучше один пул потоков на приложение или систему)</a:t>
+            </a:r>
+          </a:p>
+          <a:p>
+            <a:pPr marL="342900" indent="-342900">
+              <a:buFontTx/>
+              <a:buChar char="-"/>
+            </a:pPr>
+            <a:r>
+              <a:rPr lang="ru-RU" sz="3200" dirty="0">
+                <a:latin typeface="Times New Roman" panose="02020603050405020304" pitchFamily="18" charset="0"/>
+                <a:cs typeface="Times New Roman" panose="02020603050405020304" pitchFamily="18" charset="0"/>
+              </a:rPr>
+              <a:t>и</a:t>
+            </a:r>
+            <a:r>
+              <a:rPr lang="ru-RU" sz="3200" dirty="0" smtClean="0">
+                <a:latin typeface="Times New Roman" panose="02020603050405020304" pitchFamily="18" charset="0"/>
+                <a:cs typeface="Times New Roman" panose="02020603050405020304" pitchFamily="18" charset="0"/>
+              </a:rPr>
+              <a:t>спользовать общий пул потоков, если не требуется особая настройка</a:t>
+            </a:r>
+          </a:p>
+          <a:p>
+            <a:pPr marL="342900" indent="-342900">
+              <a:buFontTx/>
+              <a:buChar char="-"/>
+            </a:pPr>
+            <a:r>
+              <a:rPr lang="ru-RU" sz="3200" dirty="0" smtClean="0">
+                <a:latin typeface="Times New Roman" panose="02020603050405020304" pitchFamily="18" charset="0"/>
+                <a:cs typeface="Times New Roman" panose="02020603050405020304" pitchFamily="18" charset="0"/>
+              </a:rPr>
+              <a:t>использовать разумный порог для разделения </a:t>
+            </a:r>
+            <a:r>
+              <a:rPr lang="en-US" sz="3200" dirty="0" err="1" smtClean="0">
+                <a:latin typeface="Times New Roman" panose="02020603050405020304" pitchFamily="18" charset="0"/>
+                <a:cs typeface="Times New Roman" panose="02020603050405020304" pitchFamily="18" charset="0"/>
+              </a:rPr>
+              <a:t>ForkJoinTask</a:t>
+            </a:r>
+            <a:r>
+              <a:rPr lang="en-US" sz="3200" dirty="0" smtClean="0">
+                <a:latin typeface="Times New Roman" panose="02020603050405020304" pitchFamily="18" charset="0"/>
+                <a:cs typeface="Times New Roman" panose="02020603050405020304" pitchFamily="18" charset="0"/>
+              </a:rPr>
+              <a:t> </a:t>
+            </a:r>
+            <a:r>
+              <a:rPr lang="ru-RU" sz="3200" dirty="0" smtClean="0">
+                <a:latin typeface="Times New Roman" panose="02020603050405020304" pitchFamily="18" charset="0"/>
+                <a:cs typeface="Times New Roman" panose="02020603050405020304" pitchFamily="18" charset="0"/>
+              </a:rPr>
+              <a:t>на подзадачи</a:t>
+            </a:r>
+          </a:p>
+          <a:p>
+            <a:pPr marL="342900" indent="-342900">
+              <a:buFontTx/>
+              <a:buChar char="-"/>
+            </a:pPr>
+            <a:r>
+              <a:rPr lang="ru-RU" sz="3200" dirty="0">
+                <a:latin typeface="Times New Roman" panose="02020603050405020304" pitchFamily="18" charset="0"/>
+                <a:cs typeface="Times New Roman" panose="02020603050405020304" pitchFamily="18" charset="0"/>
+              </a:rPr>
+              <a:t>и</a:t>
+            </a:r>
+            <a:r>
+              <a:rPr lang="ru-RU" sz="3200" dirty="0" smtClean="0">
+                <a:latin typeface="Times New Roman" panose="02020603050405020304" pitchFamily="18" charset="0"/>
+                <a:cs typeface="Times New Roman" panose="02020603050405020304" pitchFamily="18" charset="0"/>
+              </a:rPr>
+              <a:t>збегать любых блокировок в ваших </a:t>
+            </a:r>
+            <a:r>
+              <a:rPr lang="en-US" sz="3200" dirty="0" err="1" smtClean="0">
+                <a:latin typeface="Times New Roman" panose="02020603050405020304" pitchFamily="18" charset="0"/>
+                <a:cs typeface="Times New Roman" panose="02020603050405020304" pitchFamily="18" charset="0"/>
+              </a:rPr>
+              <a:t>ForkJoinTask</a:t>
+            </a:r>
+            <a:r>
+              <a:rPr lang="ru-RU" sz="3200" dirty="0" smtClean="0">
+                <a:latin typeface="Times New Roman" panose="02020603050405020304" pitchFamily="18" charset="0"/>
+                <a:cs typeface="Times New Roman" panose="02020603050405020304" pitchFamily="18" charset="0"/>
+              </a:rPr>
+              <a:t>-ах</a:t>
+            </a:r>
+          </a:p>
+        </p:txBody>
+      </p:sp>
+    </p:spTree>
+    <p:extLst>
+      <p:ext uri="{BB962C8B-B14F-4D97-AF65-F5344CB8AC3E}">
+        <p14:creationId xmlns:p14="http://schemas.microsoft.com/office/powerpoint/2010/main" val="709801214"/>
+      </p:ext>
+    </p:extLst>
+  </p:cSld>
+  <p:clrMapOvr>
+    <a:masterClrMapping/>
+  </p:clrMapOvr>
+  <p:timing>
+    <p:tnLst>
+      <p:par>
+        <p:cTn id="1" dur="indefinite" restart="never" nodeType="tmRoot"/>
+      </p:par>
+    </p:tnLst>
+  </p:timing>
+</p:sld>
+</file>
+
+<file path=ppt/slides/slide14.xml><?xml version="1.0" encoding="utf-8"?>
+<p:sld xmlns:a="http://schemas.openxmlformats.org/drawingml/2006/main" xmlns:r="http://schemas.openxmlformats.org/officeDocument/2006/relationships" xmlns:p="http://schemas.openxmlformats.org/presentationml/2006/main">
+  <p:cSld>
+    <p:spTree>
+      <p:nvGrpSpPr>
+        <p:cNvPr id="1" name=""/>
+        <p:cNvGrpSpPr/>
+        <p:nvPr/>
+      </p:nvGrpSpPr>
+      <p:grpSpPr>
+        <a:xfrm>
+          <a:off x="0" y="0"/>
+          <a:ext cx="0" cy="0"/>
+          <a:chOff x="0" y="0"/>
+          <a:chExt cx="0" cy="0"/>
+        </a:xfrm>
+      </p:grpSpPr>
+      <p:sp>
+        <p:nvSpPr>
+          <p:cNvPr id="5" name="TextBox 4"/>
+          <p:cNvSpPr txBox="1"/>
+          <p:nvPr/>
+        </p:nvSpPr>
+        <p:spPr>
+          <a:xfrm>
+            <a:off x="1" y="6273225"/>
+            <a:ext cx="12191999" cy="584775"/>
+          </a:xfrm>
+          <a:prstGeom prst="rect">
+            <a:avLst/>
+          </a:prstGeom>
+        </p:spPr>
+        <p:style>
+          <a:lnRef idx="1">
+            <a:schemeClr val="accent2"/>
+          </a:lnRef>
+          <a:fillRef idx="2">
+            <a:schemeClr val="accent2"/>
+          </a:fillRef>
+          <a:effectRef idx="1">
+            <a:schemeClr val="accent2"/>
+          </a:effectRef>
+          <a:fontRef idx="minor">
+            <a:schemeClr val="dk1"/>
+          </a:fontRef>
+        </p:style>
+        <p:txBody>
+          <a:bodyPr wrap="square" rtlCol="0">
+            <a:spAutoFit/>
+          </a:bodyPr>
+          <a:lstStyle/>
+          <a:p>
+            <a:pPr algn="ctr"/>
+            <a:endParaRPr lang="ru-RU" sz="3200" dirty="0">
+              <a:solidFill>
+                <a:schemeClr val="bg1"/>
+              </a:solidFill>
+              <a:latin typeface="Times New Roman" panose="02020603050405020304" pitchFamily="18" charset="0"/>
+              <a:cs typeface="Times New Roman" panose="02020603050405020304" pitchFamily="18" charset="0"/>
+            </a:endParaRPr>
+          </a:p>
+        </p:txBody>
+      </p:sp>
+      <p:sp>
+        <p:nvSpPr>
+          <p:cNvPr id="8" name="TextBox 7"/>
+          <p:cNvSpPr txBox="1"/>
+          <p:nvPr/>
+        </p:nvSpPr>
+        <p:spPr>
+          <a:xfrm>
+            <a:off x="0" y="-575"/>
+            <a:ext cx="12191999" cy="584775"/>
+          </a:xfrm>
+          <a:prstGeom prst="rect">
+            <a:avLst/>
+          </a:prstGeom>
+        </p:spPr>
+        <p:style>
+          <a:lnRef idx="1">
+            <a:schemeClr val="accent2"/>
+          </a:lnRef>
+          <a:fillRef idx="2">
+            <a:schemeClr val="accent2"/>
+          </a:fillRef>
+          <a:effectRef idx="1">
+            <a:schemeClr val="accent2"/>
+          </a:effectRef>
+          <a:fontRef idx="minor">
+            <a:schemeClr val="dk1"/>
+          </a:fontRef>
+        </p:style>
+        <p:txBody>
+          <a:bodyPr wrap="square" rtlCol="0">
+            <a:spAutoFit/>
+          </a:bodyPr>
+          <a:lstStyle/>
+          <a:p>
+            <a:pPr algn="ctr"/>
+            <a:r>
+              <a:rPr lang="ru-RU" sz="3200" b="1" dirty="0" smtClean="0">
+                <a:solidFill>
+                  <a:srgbClr val="002060"/>
+                </a:solidFill>
+                <a:latin typeface="Times New Roman" panose="02020603050405020304" pitchFamily="18" charset="0"/>
+                <a:cs typeface="Times New Roman" panose="02020603050405020304" pitchFamily="18" charset="0"/>
+              </a:rPr>
               <a:t>Ссылки на используемый материал</a:t>
             </a:r>
             <a:endParaRPr lang="ru-RU" sz="3200" b="1" dirty="0">
@@ -5127,7 +5844,7 @@
 </p:sld>
 </file>
 
-<file path=ppt/slides/slide13.xml><?xml version="1.0" encoding="utf-8"?>
+<file path=ppt/slides/slide15.xml><?xml version="1.0" encoding="utf-8"?>
 <p:sld xmlns:a="http://schemas.openxmlformats.org/drawingml/2006/main" xmlns:r="http://schemas.openxmlformats.org/officeDocument/2006/relationships" xmlns:p="http://schemas.openxmlformats.org/presentationml/2006/main">
   <p:cSld>
     <p:bg>
@@ -5552,7 +6269,14 @@
                 <a:latin typeface="Times New Roman" panose="02020603050405020304" pitchFamily="18" charset="0"/>
                 <a:cs typeface="Times New Roman" panose="02020603050405020304" pitchFamily="18" charset="0"/>
               </a:rPr>
-              <a:t>ork stealing</a:t>
+              <a:t>ork </a:t>
+            </a:r>
+            <a:r>
+              <a:rPr lang="en-US" sz="3200" dirty="0" smtClean="0">
+                <a:latin typeface="Times New Roman" panose="02020603050405020304" pitchFamily="18" charset="0"/>
+                <a:cs typeface="Times New Roman" panose="02020603050405020304" pitchFamily="18" charset="0"/>
+              </a:rPr>
+              <a:t>stealing</a:t>
             </a:r>
           </a:p>
           <a:p>
@@ -5565,15 +6289,19 @@
                 <a:latin typeface="Times New Roman" panose="02020603050405020304" pitchFamily="18" charset="0"/>
                 <a:cs typeface="Times New Roman" panose="02020603050405020304" pitchFamily="18" charset="0"/>
               </a:rPr>
-              <a:t>Методы</a:t>
+              <a:t>Метод </a:t>
             </a:r>
             <a:r>
               <a:rPr lang="en-US" sz="3200" dirty="0" smtClean="0">
                 <a:latin typeface="Times New Roman" panose="02020603050405020304" pitchFamily="18" charset="0"/>
                 <a:cs typeface="Times New Roman" panose="02020603050405020304" pitchFamily="18" charset="0"/>
               </a:rPr>
-              <a:t> fork(), join(), invoke()</a:t>
-            </a:r>
+              <a:t>compute()</a:t>
+            </a:r>
+            <a:endParaRPr lang="en-US" sz="3200" dirty="0" smtClean="0">
+              <a:latin typeface="Times New Roman" panose="02020603050405020304" pitchFamily="18" charset="0"/>
+              <a:cs typeface="Times New Roman" panose="02020603050405020304" pitchFamily="18" charset="0"/>
+            </a:endParaRPr>
           </a:p>
           <a:p>
             <a:pPr marL="457200" indent="-457200">
@@ -5585,6 +6313,58 @@
                 <a:latin typeface="Times New Roman" panose="02020603050405020304" pitchFamily="18" charset="0"/>
                 <a:cs typeface="Times New Roman" panose="02020603050405020304" pitchFamily="18" charset="0"/>
               </a:rPr>
+              <a:t>Основные методы</a:t>
+            </a:r>
+            <a:r>
+              <a:rPr lang="en-US" sz="3200" dirty="0" smtClean="0">
+                <a:latin typeface="Times New Roman" panose="02020603050405020304" pitchFamily="18" charset="0"/>
+                <a:cs typeface="Times New Roman" panose="02020603050405020304" pitchFamily="18" charset="0"/>
+              </a:rPr>
+              <a:t> </a:t>
+            </a:r>
+            <a:r>
+              <a:rPr lang="ru-RU" sz="3200" dirty="0" smtClean="0">
+                <a:latin typeface="Times New Roman" panose="02020603050405020304" pitchFamily="18" charset="0"/>
+                <a:cs typeface="Times New Roman" panose="02020603050405020304" pitchFamily="18" charset="0"/>
+              </a:rPr>
+              <a:t>(</a:t>
+            </a:r>
+            <a:r>
+              <a:rPr lang="en-US" sz="3200" dirty="0" smtClean="0">
+                <a:latin typeface="Times New Roman" panose="02020603050405020304" pitchFamily="18" charset="0"/>
+                <a:cs typeface="Times New Roman" panose="02020603050405020304" pitchFamily="18" charset="0"/>
+              </a:rPr>
+              <a:t>fork</a:t>
+            </a:r>
+            <a:r>
+              <a:rPr lang="en-US" sz="3200" dirty="0" smtClean="0">
+                <a:latin typeface="Times New Roman" panose="02020603050405020304" pitchFamily="18" charset="0"/>
+                <a:cs typeface="Times New Roman" panose="02020603050405020304" pitchFamily="18" charset="0"/>
+              </a:rPr>
+              <a:t>(), join(), </a:t>
+            </a:r>
+            <a:r>
+              <a:rPr lang="ru-RU" sz="3200" dirty="0" smtClean="0">
+                <a:latin typeface="Times New Roman" panose="02020603050405020304" pitchFamily="18" charset="0"/>
+                <a:cs typeface="Times New Roman" panose="02020603050405020304" pitchFamily="18" charset="0"/>
+              </a:rPr>
+              <a:t>…)</a:t>
+            </a:r>
+            <a:endParaRPr lang="en-US" sz="3200" dirty="0" smtClean="0">
+              <a:latin typeface="Times New Roman" panose="02020603050405020304" pitchFamily="18" charset="0"/>
+              <a:cs typeface="Times New Roman" panose="02020603050405020304" pitchFamily="18" charset="0"/>
+            </a:endParaRPr>
+          </a:p>
+          <a:p>
+            <a:pPr marL="457200" indent="-457200">
+              <a:buFontTx/>
+              <a:buChar char="-"/>
+            </a:pPr>
+            <a:r>
+              <a:rPr lang="ru-RU" sz="3200" dirty="0" smtClean="0">
+                <a:latin typeface="Times New Roman" panose="02020603050405020304" pitchFamily="18" charset="0"/>
+                <a:cs typeface="Times New Roman" panose="02020603050405020304" pitchFamily="18" charset="0"/>
+              </a:rPr>
               <a:t>Выбор </a:t>
             </a:r>
             <a:r>
@@ -5609,21 +6389,12 @@
                 <a:latin typeface="Times New Roman" panose="02020603050405020304" pitchFamily="18" charset="0"/>
                 <a:cs typeface="Times New Roman" panose="02020603050405020304" pitchFamily="18" charset="0"/>
               </a:rPr>
-              <a:t>Примеры кода</a:t>
-            </a:r>
-          </a:p>
-          <a:p>
-            <a:pPr marL="457200" indent="-457200">
-              <a:buFontTx/>
-              <a:buChar char="-"/>
-            </a:pPr>
-            <a:r>
-              <a:rPr lang="ru-RU" sz="3200" dirty="0" smtClean="0">
-                <a:latin typeface="Times New Roman" panose="02020603050405020304" pitchFamily="18" charset="0"/>
-                <a:cs typeface="Times New Roman" panose="02020603050405020304" pitchFamily="18" charset="0"/>
-              </a:rPr>
               <a:t>Заключение</a:t>
             </a:r>
+            <a:endParaRPr lang="ru-RU" sz="3200" dirty="0" smtClean="0">
+              <a:latin typeface="Times New Roman" panose="02020603050405020304" pitchFamily="18" charset="0"/>
+              <a:cs typeface="Times New Roman" panose="02020603050405020304" pitchFamily="18" charset="0"/>
+            </a:endParaRPr>
           </a:p>
         </p:txBody>
       </p:sp>
@@ -5666,96 +6437,368 @@
       </p:grpSpPr>
       <p:sp>
         <p:nvSpPr>
-          <p:cNvPr id="16387" name="Rectangle 3"/>
-          <p:cNvSpPr>
-            <a:spLocks noGrp="1" noChangeArrowheads="1"/>
-          </p:cNvSpPr>
-          <p:nvPr>
-            <p:ph idx="1"/>
-          </p:nvPr>
+          <p:cNvPr id="5" name="TextBox 4"/>
+          <p:cNvSpPr txBox="1"/>
+          <p:nvPr/>
         </p:nvSpPr>
         <p:spPr>
           <a:xfrm>
-            <a:off x="1981200" y="584200"/>
-            <a:ext cx="8229600" cy="6273800"/>
+            <a:off x="1" y="6273225"/>
+            <a:ext cx="12191999" cy="584775"/>
           </a:xfrm>
+          <a:prstGeom prst="rect">
+            <a:avLst/>
+          </a:prstGeom>
         </p:spPr>
-        <p:txBody>
-          <a:bodyPr/>
+        <p:style>
+          <a:lnRef idx="1">
+            <a:schemeClr val="accent2"/>
+          </a:lnRef>
+          <a:fillRef idx="2">
+            <a:schemeClr val="accent2"/>
+          </a:fillRef>
+          <a:effectRef idx="1">
+            <a:schemeClr val="accent2"/>
+          </a:effectRef>
+          <a:fontRef idx="minor">
+            <a:schemeClr val="dk1"/>
+          </a:fontRef>
+        </p:style>
+        <p:txBody>
+          <a:bodyPr wrap="square" rtlCol="0">
+            <a:spAutoFit/>
+          </a:bodyPr>
           <a:lstStyle/>
           <a:p>
-            <a:pPr eaLnBrk="1" hangingPunct="1"/>
-            <a:r>
-              <a:rPr lang="en-US" altLang="ru-RU" dirty="0" smtClean="0"/>
-              <a:t>Fork-join </a:t>
-            </a:r>
-            <a:r>
-              <a:rPr lang="ru-RU" altLang="ru-RU" dirty="0" smtClean="0"/>
-              <a:t>параллелизм</a:t>
-            </a:r>
-          </a:p>
-          <a:p>
-            <a:pPr eaLnBrk="1" hangingPunct="1"/>
-            <a:endParaRPr lang="ru-RU" altLang="ru-RU" dirty="0" smtClean="0"/>
-          </a:p>
-          <a:p>
-            <a:pPr eaLnBrk="1" hangingPunct="1"/>
-            <a:endParaRPr lang="ru-RU" altLang="ru-RU" dirty="0" smtClean="0"/>
-          </a:p>
-          <a:p>
-            <a:pPr eaLnBrk="1" hangingPunct="1"/>
-            <a:endParaRPr lang="ru-RU" altLang="ru-RU" dirty="0" smtClean="0"/>
-          </a:p>
-          <a:p>
-            <a:pPr eaLnBrk="1" hangingPunct="1"/>
-            <a:endParaRPr lang="en-US" altLang="ru-RU" dirty="0" smtClean="0"/>
-          </a:p>
-          <a:p>
-            <a:pPr eaLnBrk="1" hangingPunct="1"/>
-            <a:endParaRPr lang="ru-RU" altLang="ru-RU" dirty="0" smtClean="0"/>
-          </a:p>
-          <a:p>
-            <a:pPr eaLnBrk="1" hangingPunct="1"/>
-            <a:endParaRPr lang="ru-RU" altLang="ru-RU" dirty="0"/>
-          </a:p>
-          <a:p>
-            <a:pPr eaLnBrk="1" hangingPunct="1"/>
-            <a:endParaRPr lang="ru-RU" altLang="ru-RU" dirty="0" smtClean="0"/>
-          </a:p>
-          <a:p>
-            <a:pPr eaLnBrk="1" hangingPunct="1"/>
-            <a:endParaRPr lang="ru-RU" altLang="ru-RU" dirty="0"/>
-          </a:p>
-          <a:p>
-            <a:pPr eaLnBrk="1" hangingPunct="1"/>
-            <a:endParaRPr lang="en-US" altLang="ru-RU" dirty="0" smtClean="0"/>
-          </a:p>
-          <a:p>
-            <a:pPr eaLnBrk="1" hangingPunct="1"/>
-            <a:r>
-              <a:rPr lang="ru-RU" altLang="ru-RU" sz="2600" dirty="0"/>
-              <a:t>Явное указание параллельных секций</a:t>
-            </a:r>
-          </a:p>
-          <a:p>
-            <a:pPr eaLnBrk="1" hangingPunct="1"/>
-            <a:r>
-              <a:rPr lang="ru-RU" altLang="ru-RU" sz="2600" dirty="0"/>
-              <a:t>Поддержка вложенного параллелизма</a:t>
-            </a:r>
-          </a:p>
-          <a:p>
-            <a:pPr eaLnBrk="1" hangingPunct="1"/>
-            <a:r>
-              <a:rPr lang="ru-RU" altLang="ru-RU" sz="2600" dirty="0"/>
-              <a:t>Поддержка динамических потоков</a:t>
-            </a:r>
+            <a:pPr algn="ctr"/>
+            <a:endParaRPr lang="ru-RU" sz="3200" dirty="0">
+              <a:solidFill>
+                <a:schemeClr val="bg1"/>
+              </a:solidFill>
+              <a:latin typeface="Times New Roman" panose="02020603050405020304" pitchFamily="18" charset="0"/>
+              <a:cs typeface="Times New Roman" panose="02020603050405020304" pitchFamily="18" charset="0"/>
+            </a:endParaRPr>
+          </a:p>
+        </p:txBody>
+      </p:sp>
+      <p:sp>
+        <p:nvSpPr>
+          <p:cNvPr id="8" name="TextBox 7"/>
+          <p:cNvSpPr txBox="1"/>
+          <p:nvPr/>
+        </p:nvSpPr>
+        <p:spPr>
+          <a:xfrm>
+            <a:off x="0" y="-575"/>
+            <a:ext cx="12191999" cy="584775"/>
+          </a:xfrm>
+          <a:prstGeom prst="rect">
+            <a:avLst/>
+          </a:prstGeom>
+        </p:spPr>
+        <p:style>
+          <a:lnRef idx="1">
+            <a:schemeClr val="accent2"/>
+          </a:lnRef>
+          <a:fillRef idx="2">
+            <a:schemeClr val="accent2"/>
+          </a:fillRef>
+          <a:effectRef idx="1">
+            <a:schemeClr val="accent2"/>
+          </a:effectRef>
+          <a:fontRef idx="minor">
+            <a:schemeClr val="dk1"/>
+          </a:fontRef>
+        </p:style>
+        <p:txBody>
+          <a:bodyPr wrap="square" rtlCol="0">
+            <a:spAutoFit/>
+          </a:bodyPr>
+          <a:lstStyle/>
+          <a:p>
+            <a:pPr algn="ctr"/>
+            <a:r>
+              <a:rPr lang="ru-RU" sz="3200" b="1" dirty="0" smtClean="0">
+                <a:solidFill>
+                  <a:srgbClr val="002060"/>
+                </a:solidFill>
+                <a:latin typeface="Times New Roman" panose="02020603050405020304" pitchFamily="18" charset="0"/>
+                <a:cs typeface="Times New Roman" panose="02020603050405020304" pitchFamily="18" charset="0"/>
+              </a:rPr>
+              <a:t>Введение в </a:t>
+            </a:r>
+            <a:r>
+              <a:rPr lang="en-US" sz="3200" b="1" dirty="0" smtClean="0">
+                <a:solidFill>
+                  <a:srgbClr val="002060"/>
+                </a:solidFill>
+                <a:latin typeface="Times New Roman" panose="02020603050405020304" pitchFamily="18" charset="0"/>
+                <a:cs typeface="Times New Roman" panose="02020603050405020304" pitchFamily="18" charset="0"/>
+              </a:rPr>
+              <a:t>fork/join</a:t>
+            </a:r>
+            <a:endParaRPr lang="ru-RU" sz="3200" b="1" dirty="0">
+              <a:solidFill>
+                <a:srgbClr val="002060"/>
+              </a:solidFill>
+              <a:latin typeface="Times New Roman" panose="02020603050405020304" pitchFamily="18" charset="0"/>
+              <a:cs typeface="Times New Roman" panose="02020603050405020304" pitchFamily="18" charset="0"/>
+            </a:endParaRPr>
+          </a:p>
+        </p:txBody>
+      </p:sp>
+      <p:sp>
+        <p:nvSpPr>
+          <p:cNvPr id="7" name="TextBox 6"/>
+          <p:cNvSpPr txBox="1"/>
+          <p:nvPr/>
+        </p:nvSpPr>
+        <p:spPr>
+          <a:xfrm>
+            <a:off x="334962" y="584200"/>
+            <a:ext cx="11522075" cy="3477875"/>
+          </a:xfrm>
+          <a:prstGeom prst="rect">
+            <a:avLst/>
+          </a:prstGeom>
+          <a:noFill/>
+        </p:spPr>
+        <p:txBody>
+          <a:bodyPr wrap="square" rtlCol="0">
+            <a:spAutoFit/>
+          </a:bodyPr>
+          <a:lstStyle/>
+          <a:p>
+            <a:r>
+              <a:rPr lang="en-US" sz="2000" dirty="0" smtClean="0">
+                <a:latin typeface="Times New Roman" panose="02020603050405020304" pitchFamily="18" charset="0"/>
+                <a:cs typeface="Times New Roman" panose="02020603050405020304" pitchFamily="18" charset="0"/>
+              </a:rPr>
+              <a:t>Fork</a:t>
+            </a:r>
+            <a:r>
+              <a:rPr lang="ru-RU" sz="2000" dirty="0" smtClean="0">
+                <a:latin typeface="Times New Roman" panose="02020603050405020304" pitchFamily="18" charset="0"/>
+                <a:cs typeface="Times New Roman" panose="02020603050405020304" pitchFamily="18" charset="0"/>
+              </a:rPr>
+              <a:t> </a:t>
+            </a:r>
+            <a:r>
+              <a:rPr lang="en-US" sz="2000" dirty="0" smtClean="0">
+                <a:latin typeface="Times New Roman" panose="02020603050405020304" pitchFamily="18" charset="0"/>
+                <a:cs typeface="Times New Roman" panose="02020603050405020304" pitchFamily="18" charset="0"/>
+              </a:rPr>
+              <a:t>Join</a:t>
+            </a:r>
+            <a:r>
+              <a:rPr lang="ru-RU" sz="2000" dirty="0" smtClean="0">
+                <a:latin typeface="Times New Roman" panose="02020603050405020304" pitchFamily="18" charset="0"/>
+                <a:cs typeface="Times New Roman" panose="02020603050405020304" pitchFamily="18" charset="0"/>
+              </a:rPr>
+              <a:t> </a:t>
+            </a:r>
+            <a:r>
+              <a:rPr lang="en-US" sz="2000" dirty="0" smtClean="0">
+                <a:latin typeface="Times New Roman" panose="02020603050405020304" pitchFamily="18" charset="0"/>
+                <a:cs typeface="Times New Roman" panose="02020603050405020304" pitchFamily="18" charset="0"/>
+              </a:rPr>
+              <a:t>Framework </a:t>
+            </a:r>
+            <a:r>
+              <a:rPr lang="ru-RU" sz="2000" dirty="0" smtClean="0">
+                <a:latin typeface="Times New Roman" panose="02020603050405020304" pitchFamily="18" charset="0"/>
+                <a:cs typeface="Times New Roman" panose="02020603050405020304" pitchFamily="18" charset="0"/>
+              </a:rPr>
+              <a:t>появился в </a:t>
+            </a:r>
+            <a:r>
+              <a:rPr lang="en-US" sz="2000" dirty="0" smtClean="0">
+                <a:latin typeface="Times New Roman" panose="02020603050405020304" pitchFamily="18" charset="0"/>
+                <a:cs typeface="Times New Roman" panose="02020603050405020304" pitchFamily="18" charset="0"/>
+              </a:rPr>
+              <a:t>Java 1</a:t>
+            </a:r>
+            <a:r>
+              <a:rPr lang="ru-RU" sz="2000" dirty="0" smtClean="0">
+                <a:latin typeface="Times New Roman" panose="02020603050405020304" pitchFamily="18" charset="0"/>
+                <a:cs typeface="Times New Roman" panose="02020603050405020304" pitchFamily="18" charset="0"/>
+              </a:rPr>
+              <a:t>.7.</a:t>
+            </a:r>
+          </a:p>
+          <a:p>
+            <a:r>
+              <a:rPr lang="ru-RU" sz="2000" dirty="0">
+                <a:latin typeface="Times New Roman" panose="02020603050405020304" pitchFamily="18" charset="0"/>
+                <a:cs typeface="Times New Roman" panose="02020603050405020304" pitchFamily="18" charset="0"/>
+              </a:rPr>
+              <a:t>Используя простой </a:t>
+            </a:r>
+            <a:r>
+              <a:rPr lang="en-US" sz="2000" dirty="0" err="1">
+                <a:latin typeface="Times New Roman" panose="02020603050405020304" pitchFamily="18" charset="0"/>
+                <a:cs typeface="Times New Roman" panose="02020603050405020304" pitchFamily="18" charset="0"/>
+              </a:rPr>
+              <a:t>ThreadPoolExecutor</a:t>
+            </a:r>
+            <a:r>
+              <a:rPr lang="ru-RU" sz="2000" dirty="0">
+                <a:latin typeface="Times New Roman" panose="02020603050405020304" pitchFamily="18" charset="0"/>
+                <a:cs typeface="Times New Roman" panose="02020603050405020304" pitchFamily="18" charset="0"/>
+              </a:rPr>
+              <a:t>, можно быстро исчерпать потоки, поскольку для выполнения каждой задачи или подзадачи требуется собственный </a:t>
+            </a:r>
+            <a:r>
+              <a:rPr lang="ru-RU" sz="2000" dirty="0" smtClean="0">
+                <a:latin typeface="Times New Roman" panose="02020603050405020304" pitchFamily="18" charset="0"/>
+                <a:cs typeface="Times New Roman" panose="02020603050405020304" pitchFamily="18" charset="0"/>
+              </a:rPr>
+              <a:t>поток. </a:t>
+            </a:r>
+          </a:p>
+          <a:p>
+            <a:r>
+              <a:rPr lang="ru-RU" sz="2000" dirty="0" smtClean="0">
+                <a:latin typeface="Times New Roman" panose="02020603050405020304" pitchFamily="18" charset="0"/>
+                <a:cs typeface="Times New Roman" panose="02020603050405020304" pitchFamily="18" charset="0"/>
+              </a:rPr>
+              <a:t>В рамках </a:t>
+            </a:r>
+            <a:r>
+              <a:rPr lang="en-US" sz="2000" dirty="0" smtClean="0">
+                <a:latin typeface="Times New Roman" panose="02020603050405020304" pitchFamily="18" charset="0"/>
+                <a:cs typeface="Times New Roman" panose="02020603050405020304" pitchFamily="18" charset="0"/>
+              </a:rPr>
+              <a:t>fork/join </a:t>
+            </a:r>
+            <a:r>
+              <a:rPr lang="ru-RU" sz="2000" dirty="0" smtClean="0">
+                <a:latin typeface="Times New Roman" panose="02020603050405020304" pitchFamily="18" charset="0"/>
+                <a:cs typeface="Times New Roman" panose="02020603050405020304" pitchFamily="18" charset="0"/>
+              </a:rPr>
+              <a:t>любая задача может порождать </a:t>
+            </a:r>
+            <a:r>
+              <a:rPr lang="en-US" sz="2000" dirty="0" smtClean="0">
+                <a:latin typeface="Times New Roman" panose="02020603050405020304" pitchFamily="18" charset="0"/>
+                <a:cs typeface="Times New Roman" panose="02020603050405020304" pitchFamily="18" charset="0"/>
+              </a:rPr>
+              <a:t>(fork) </a:t>
+            </a:r>
+            <a:r>
+              <a:rPr lang="ru-RU" sz="2000" dirty="0" smtClean="0">
+                <a:latin typeface="Times New Roman" panose="02020603050405020304" pitchFamily="18" charset="0"/>
+                <a:cs typeface="Times New Roman" panose="02020603050405020304" pitchFamily="18" charset="0"/>
+              </a:rPr>
+              <a:t>несколько подзадач, рекурсивно разбивая задачу на более мелкие независимые подзадачи, пока они не станут достаточно простыми для асинхронного выполнения, и ожидать их завершения, используя метод </a:t>
+            </a:r>
+            <a:r>
+              <a:rPr lang="en-US" sz="2000" dirty="0" smtClean="0">
+                <a:latin typeface="Times New Roman" panose="02020603050405020304" pitchFamily="18" charset="0"/>
+                <a:cs typeface="Times New Roman" panose="02020603050405020304" pitchFamily="18" charset="0"/>
+              </a:rPr>
+              <a:t>join</a:t>
+            </a:r>
+            <a:r>
+              <a:rPr lang="ru-RU" sz="2000" dirty="0" smtClean="0">
+                <a:latin typeface="Times New Roman" panose="02020603050405020304" pitchFamily="18" charset="0"/>
+                <a:cs typeface="Times New Roman" panose="02020603050405020304" pitchFamily="18" charset="0"/>
+              </a:rPr>
+              <a:t>.</a:t>
+            </a:r>
+          </a:p>
+          <a:p>
+            <a:r>
+              <a:rPr lang="ru-RU" sz="2000" dirty="0" smtClean="0">
+                <a:latin typeface="Times New Roman" panose="02020603050405020304" pitchFamily="18" charset="0"/>
+                <a:cs typeface="Times New Roman" panose="02020603050405020304" pitchFamily="18" charset="0"/>
+              </a:rPr>
+              <a:t>Для обеспечения эффективного параллельного выполнения, данная инфраструктура использует пул потоков, называемый </a:t>
+            </a:r>
+            <a:r>
+              <a:rPr lang="en-US" sz="2000" dirty="0" err="1" smtClean="0">
+                <a:latin typeface="Times New Roman" panose="02020603050405020304" pitchFamily="18" charset="0"/>
+                <a:cs typeface="Times New Roman" panose="02020603050405020304" pitchFamily="18" charset="0"/>
+              </a:rPr>
+              <a:t>ForkJoinPool</a:t>
+            </a:r>
+            <a:r>
+              <a:rPr lang="ru-RU" sz="2000" dirty="0" smtClean="0">
+                <a:latin typeface="Times New Roman" panose="02020603050405020304" pitchFamily="18" charset="0"/>
+                <a:cs typeface="Times New Roman" panose="02020603050405020304" pitchFamily="18" charset="0"/>
+              </a:rPr>
+              <a:t>, который управляет потоками типа </a:t>
+            </a:r>
+            <a:r>
+              <a:rPr lang="en-US" sz="2000" dirty="0" err="1" smtClean="0">
+                <a:latin typeface="Times New Roman" panose="02020603050405020304" pitchFamily="18" charset="0"/>
+                <a:cs typeface="Times New Roman" panose="02020603050405020304" pitchFamily="18" charset="0"/>
+              </a:rPr>
+              <a:t>ForkJoinWorkerThread</a:t>
+            </a:r>
+            <a:r>
+              <a:rPr lang="ru-RU" sz="2000" dirty="0">
+                <a:latin typeface="Times New Roman" panose="02020603050405020304" pitchFamily="18" charset="0"/>
+                <a:cs typeface="Times New Roman" panose="02020603050405020304" pitchFamily="18" charset="0"/>
+              </a:rPr>
+              <a:t>.</a:t>
+            </a:r>
+            <a:r>
+              <a:rPr lang="ru-RU" sz="2000" dirty="0" smtClean="0">
+                <a:latin typeface="Times New Roman" panose="02020603050405020304" pitchFamily="18" charset="0"/>
+                <a:cs typeface="Times New Roman" panose="02020603050405020304" pitchFamily="18" charset="0"/>
+              </a:rPr>
+              <a:t> </a:t>
+            </a:r>
+          </a:p>
+          <a:p>
+            <a:r>
+              <a:rPr lang="ru-RU" sz="2000" dirty="0" smtClean="0">
+                <a:latin typeface="Times New Roman" panose="02020603050405020304" pitchFamily="18" charset="0"/>
+                <a:cs typeface="Times New Roman" panose="02020603050405020304" pitchFamily="18" charset="0"/>
+              </a:rPr>
+              <a:t>Преимущество </a:t>
+            </a:r>
+            <a:r>
+              <a:rPr lang="en-US" sz="2000" dirty="0" smtClean="0">
+                <a:latin typeface="Times New Roman" panose="02020603050405020304" pitchFamily="18" charset="0"/>
+                <a:cs typeface="Times New Roman" panose="02020603050405020304" pitchFamily="18" charset="0"/>
+              </a:rPr>
+              <a:t>fork/join </a:t>
+            </a:r>
+            <a:r>
+              <a:rPr lang="ru-RU" sz="2000" dirty="0" smtClean="0">
+                <a:latin typeface="Times New Roman" panose="02020603050405020304" pitchFamily="18" charset="0"/>
+                <a:cs typeface="Times New Roman" panose="02020603050405020304" pitchFamily="18" charset="0"/>
+              </a:rPr>
+              <a:t>состоит в том, что он не создаёт новый поток для каждой задачи или подзадачи, вместо этого реализуя алгоритм </a:t>
+            </a:r>
+            <a:r>
+              <a:rPr lang="en-US" sz="2000" dirty="0" smtClean="0">
+                <a:latin typeface="Times New Roman" panose="02020603050405020304" pitchFamily="18" charset="0"/>
+                <a:cs typeface="Times New Roman" panose="02020603050405020304" pitchFamily="18" charset="0"/>
+              </a:rPr>
+              <a:t>work stealing</a:t>
+            </a:r>
+            <a:r>
+              <a:rPr lang="ru-RU" sz="2000" dirty="0" smtClean="0">
+                <a:latin typeface="Times New Roman" panose="02020603050405020304" pitchFamily="18" charset="0"/>
+                <a:cs typeface="Times New Roman" panose="02020603050405020304" pitchFamily="18" charset="0"/>
+              </a:rPr>
+              <a:t>.</a:t>
+            </a:r>
+          </a:p>
+          <a:p>
+            <a:endParaRPr lang="ru-RU" sz="2000" dirty="0" smtClean="0">
+              <a:latin typeface="Times New Roman" panose="02020603050405020304" pitchFamily="18" charset="0"/>
+              <a:cs typeface="Times New Roman" panose="02020603050405020304" pitchFamily="18" charset="0"/>
+            </a:endParaRPr>
           </a:p>
         </p:txBody>
       </p:sp>
       <p:pic>
         <p:nvPicPr>
-          <p:cNvPr id="16388" name="Picture 5" descr="fork_join"/>
+          <p:cNvPr id="6" name="Picture 5" descr="fork_join"/>
           <p:cNvPicPr>
             <a:picLocks noChangeAspect="1" noChangeArrowheads="1"/>
           </p:cNvPicPr>
@@ -5776,8 +6819,8 @@
         </p:blipFill>
         <p:spPr bwMode="auto">
           <a:xfrm>
-            <a:off x="2149225" y="1380038"/>
-            <a:ext cx="8189912" cy="2771775"/>
+            <a:off x="2064543" y="3705343"/>
+            <a:ext cx="7587457" cy="2567882"/>
           </a:xfrm>
           <a:prstGeom prst="rect">
             <a:avLst/>
@@ -5810,7 +6853,7 @@
     </p:spTree>
     <p:extLst>
       <p:ext uri="{BB962C8B-B14F-4D97-AF65-F5344CB8AC3E}">
-        <p14:creationId xmlns:p14="http://schemas.microsoft.com/office/powerpoint/2010/main" val="1128584120"/>
+        <p14:creationId xmlns:p14="http://schemas.microsoft.com/office/powerpoint/2010/main" val="2482080637"/>
       </p:ext>
     </p:extLst>
   </p:cSld>
@@ -5830,412 +6873,6 @@
 <file path=ppt/slides/slide4.xml><?xml version="1.0" encoding="utf-8"?>
 <p:sld xmlns:a="http://schemas.openxmlformats.org/drawingml/2006/main" xmlns:r="http://schemas.openxmlformats.org/officeDocument/2006/relationships" xmlns:p="http://schemas.openxmlformats.org/presentationml/2006/main">
   <p:cSld>
-    <p:spTree>
-      <p:nvGrpSpPr>
-        <p:cNvPr id="1" name=""/>
-        <p:cNvGrpSpPr/>
-        <p:nvPr/>
-      </p:nvGrpSpPr>
-      <p:grpSpPr>
-        <a:xfrm>
-          <a:off x="0" y="0"/>
-          <a:ext cx="0" cy="0"/>
-          <a:chOff x="0" y="0"/>
-          <a:chExt cx="0" cy="0"/>
-        </a:xfrm>
-      </p:grpSpPr>
-      <p:sp>
-        <p:nvSpPr>
-          <p:cNvPr id="5" name="TextBox 4"/>
-          <p:cNvSpPr txBox="1"/>
-          <p:nvPr/>
-        </p:nvSpPr>
-        <p:spPr>
-          <a:xfrm>
-            <a:off x="1" y="6273225"/>
-            <a:ext cx="12191999" cy="584775"/>
-          </a:xfrm>
-          <a:prstGeom prst="rect">
-            <a:avLst/>
-          </a:prstGeom>
-        </p:spPr>
-        <p:style>
-          <a:lnRef idx="1">
-            <a:schemeClr val="accent2"/>
-          </a:lnRef>
-          <a:fillRef idx="2">
-            <a:schemeClr val="accent2"/>
-          </a:fillRef>
-          <a:effectRef idx="1">
-            <a:schemeClr val="accent2"/>
-          </a:effectRef>
-          <a:fontRef idx="minor">
-            <a:schemeClr val="dk1"/>
-          </a:fontRef>
-        </p:style>
-        <p:txBody>
-          <a:bodyPr wrap="square" rtlCol="0">
-            <a:spAutoFit/>
-          </a:bodyPr>
-          <a:lstStyle/>
-          <a:p>
-            <a:pPr algn="ctr"/>
-            <a:endParaRPr lang="ru-RU" sz="3200" dirty="0">
-              <a:solidFill>
-                <a:schemeClr val="bg1"/>
-              </a:solidFill>
-              <a:latin typeface="Times New Roman" panose="02020603050405020304" pitchFamily="18" charset="0"/>
-              <a:cs typeface="Times New Roman" panose="02020603050405020304" pitchFamily="18" charset="0"/>
-            </a:endParaRPr>
-          </a:p>
-        </p:txBody>
-      </p:sp>
-      <p:sp>
-        <p:nvSpPr>
-          <p:cNvPr id="8" name="TextBox 7"/>
-          <p:cNvSpPr txBox="1"/>
-          <p:nvPr/>
-        </p:nvSpPr>
-        <p:spPr>
-          <a:xfrm>
-            <a:off x="0" y="-575"/>
-            <a:ext cx="12191999" cy="584775"/>
-          </a:xfrm>
-          <a:prstGeom prst="rect">
-            <a:avLst/>
-          </a:prstGeom>
-        </p:spPr>
-        <p:style>
-          <a:lnRef idx="1">
-            <a:schemeClr val="accent2"/>
-          </a:lnRef>
-          <a:fillRef idx="2">
-            <a:schemeClr val="accent2"/>
-          </a:fillRef>
-          <a:effectRef idx="1">
-            <a:schemeClr val="accent2"/>
-          </a:effectRef>
-          <a:fontRef idx="minor">
-            <a:schemeClr val="dk1"/>
-          </a:fontRef>
-        </p:style>
-        <p:txBody>
-          <a:bodyPr wrap="square" rtlCol="0">
-            <a:spAutoFit/>
-          </a:bodyPr>
-          <a:lstStyle/>
-          <a:p>
-            <a:pPr algn="ctr"/>
-            <a:r>
-              <a:rPr lang="ru-RU" sz="3200" b="1" dirty="0" smtClean="0">
-                <a:solidFill>
-                  <a:srgbClr val="002060"/>
-                </a:solidFill>
-                <a:latin typeface="Times New Roman" panose="02020603050405020304" pitchFamily="18" charset="0"/>
-                <a:cs typeface="Times New Roman" panose="02020603050405020304" pitchFamily="18" charset="0"/>
-              </a:rPr>
-              <a:t>Введение в </a:t>
-            </a:r>
-            <a:r>
-              <a:rPr lang="en-US" sz="3200" b="1" dirty="0" smtClean="0">
-                <a:solidFill>
-                  <a:srgbClr val="002060"/>
-                </a:solidFill>
-                <a:latin typeface="Times New Roman" panose="02020603050405020304" pitchFamily="18" charset="0"/>
-                <a:cs typeface="Times New Roman" panose="02020603050405020304" pitchFamily="18" charset="0"/>
-              </a:rPr>
-              <a:t>fork/join</a:t>
-            </a:r>
-            <a:endParaRPr lang="ru-RU" sz="3200" b="1" dirty="0">
-              <a:solidFill>
-                <a:srgbClr val="002060"/>
-              </a:solidFill>
-              <a:latin typeface="Times New Roman" panose="02020603050405020304" pitchFamily="18" charset="0"/>
-              <a:cs typeface="Times New Roman" panose="02020603050405020304" pitchFamily="18" charset="0"/>
-            </a:endParaRPr>
-          </a:p>
-        </p:txBody>
-      </p:sp>
-      <p:sp>
-        <p:nvSpPr>
-          <p:cNvPr id="7" name="TextBox 6"/>
-          <p:cNvSpPr txBox="1"/>
-          <p:nvPr/>
-        </p:nvSpPr>
-        <p:spPr>
-          <a:xfrm>
-            <a:off x="334962" y="584200"/>
-            <a:ext cx="11522075" cy="3477875"/>
-          </a:xfrm>
-          <a:prstGeom prst="rect">
-            <a:avLst/>
-          </a:prstGeom>
-          <a:noFill/>
-        </p:spPr>
-        <p:txBody>
-          <a:bodyPr wrap="square" rtlCol="0">
-            <a:spAutoFit/>
-          </a:bodyPr>
-          <a:lstStyle/>
-          <a:p>
-            <a:r>
-              <a:rPr lang="en-US" sz="2000" dirty="0" smtClean="0">
-                <a:latin typeface="Times New Roman" panose="02020603050405020304" pitchFamily="18" charset="0"/>
-                <a:cs typeface="Times New Roman" panose="02020603050405020304" pitchFamily="18" charset="0"/>
-              </a:rPr>
-              <a:t>Fork</a:t>
-            </a:r>
-            <a:r>
-              <a:rPr lang="ru-RU" sz="2000" dirty="0" smtClean="0">
-                <a:latin typeface="Times New Roman" panose="02020603050405020304" pitchFamily="18" charset="0"/>
-                <a:cs typeface="Times New Roman" panose="02020603050405020304" pitchFamily="18" charset="0"/>
-              </a:rPr>
-              <a:t> </a:t>
-            </a:r>
-            <a:r>
-              <a:rPr lang="en-US" sz="2000" dirty="0" smtClean="0">
-                <a:latin typeface="Times New Roman" panose="02020603050405020304" pitchFamily="18" charset="0"/>
-                <a:cs typeface="Times New Roman" panose="02020603050405020304" pitchFamily="18" charset="0"/>
-              </a:rPr>
-              <a:t>Join</a:t>
-            </a:r>
-            <a:r>
-              <a:rPr lang="ru-RU" sz="2000" dirty="0" smtClean="0">
-                <a:latin typeface="Times New Roman" panose="02020603050405020304" pitchFamily="18" charset="0"/>
-                <a:cs typeface="Times New Roman" panose="02020603050405020304" pitchFamily="18" charset="0"/>
-              </a:rPr>
-              <a:t> </a:t>
-            </a:r>
-            <a:r>
-              <a:rPr lang="en-US" sz="2000" dirty="0" smtClean="0">
-                <a:latin typeface="Times New Roman" panose="02020603050405020304" pitchFamily="18" charset="0"/>
-                <a:cs typeface="Times New Roman" panose="02020603050405020304" pitchFamily="18" charset="0"/>
-              </a:rPr>
-              <a:t>Framework </a:t>
-            </a:r>
-            <a:r>
-              <a:rPr lang="ru-RU" sz="2000" dirty="0" smtClean="0">
-                <a:latin typeface="Times New Roman" panose="02020603050405020304" pitchFamily="18" charset="0"/>
-                <a:cs typeface="Times New Roman" panose="02020603050405020304" pitchFamily="18" charset="0"/>
-              </a:rPr>
-              <a:t>появился в </a:t>
-            </a:r>
-            <a:r>
-              <a:rPr lang="en-US" sz="2000" dirty="0" smtClean="0">
-                <a:latin typeface="Times New Roman" panose="02020603050405020304" pitchFamily="18" charset="0"/>
-                <a:cs typeface="Times New Roman" panose="02020603050405020304" pitchFamily="18" charset="0"/>
-              </a:rPr>
-              <a:t>Java 1</a:t>
-            </a:r>
-            <a:r>
-              <a:rPr lang="ru-RU" sz="2000" dirty="0" smtClean="0">
-                <a:latin typeface="Times New Roman" panose="02020603050405020304" pitchFamily="18" charset="0"/>
-                <a:cs typeface="Times New Roman" panose="02020603050405020304" pitchFamily="18" charset="0"/>
-              </a:rPr>
-              <a:t>.7.</a:t>
-            </a:r>
-          </a:p>
-          <a:p>
-            <a:r>
-              <a:rPr lang="ru-RU" sz="2000" dirty="0">
-                <a:latin typeface="Times New Roman" panose="02020603050405020304" pitchFamily="18" charset="0"/>
-                <a:cs typeface="Times New Roman" panose="02020603050405020304" pitchFamily="18" charset="0"/>
-              </a:rPr>
-              <a:t>Используя простой </a:t>
-            </a:r>
-            <a:r>
-              <a:rPr lang="en-US" sz="2000" dirty="0" err="1">
-                <a:latin typeface="Times New Roman" panose="02020603050405020304" pitchFamily="18" charset="0"/>
-                <a:cs typeface="Times New Roman" panose="02020603050405020304" pitchFamily="18" charset="0"/>
-              </a:rPr>
-              <a:t>ThreadPoolExecutor</a:t>
-            </a:r>
-            <a:r>
-              <a:rPr lang="ru-RU" sz="2000" dirty="0">
-                <a:latin typeface="Times New Roman" panose="02020603050405020304" pitchFamily="18" charset="0"/>
-                <a:cs typeface="Times New Roman" panose="02020603050405020304" pitchFamily="18" charset="0"/>
-              </a:rPr>
-              <a:t>, можно быстро исчерпать потоки, поскольку для выполнения каждой задачи или подзадачи требуется собственный </a:t>
-            </a:r>
-            <a:r>
-              <a:rPr lang="ru-RU" sz="2000" dirty="0" smtClean="0">
-                <a:latin typeface="Times New Roman" panose="02020603050405020304" pitchFamily="18" charset="0"/>
-                <a:cs typeface="Times New Roman" panose="02020603050405020304" pitchFamily="18" charset="0"/>
-              </a:rPr>
-              <a:t>поток. </a:t>
-            </a:r>
-          </a:p>
-          <a:p>
-            <a:r>
-              <a:rPr lang="ru-RU" sz="2000" dirty="0" smtClean="0">
-                <a:latin typeface="Times New Roman" panose="02020603050405020304" pitchFamily="18" charset="0"/>
-                <a:cs typeface="Times New Roman" panose="02020603050405020304" pitchFamily="18" charset="0"/>
-              </a:rPr>
-              <a:t>В рамках </a:t>
-            </a:r>
-            <a:r>
-              <a:rPr lang="en-US" sz="2000" dirty="0" smtClean="0">
-                <a:latin typeface="Times New Roman" panose="02020603050405020304" pitchFamily="18" charset="0"/>
-                <a:cs typeface="Times New Roman" panose="02020603050405020304" pitchFamily="18" charset="0"/>
-              </a:rPr>
-              <a:t>fork/join </a:t>
-            </a:r>
-            <a:r>
-              <a:rPr lang="ru-RU" sz="2000" dirty="0" smtClean="0">
-                <a:latin typeface="Times New Roman" panose="02020603050405020304" pitchFamily="18" charset="0"/>
-                <a:cs typeface="Times New Roman" panose="02020603050405020304" pitchFamily="18" charset="0"/>
-              </a:rPr>
-              <a:t>любая задача может порождать </a:t>
-            </a:r>
-            <a:r>
-              <a:rPr lang="en-US" sz="2000" dirty="0" smtClean="0">
-                <a:latin typeface="Times New Roman" panose="02020603050405020304" pitchFamily="18" charset="0"/>
-                <a:cs typeface="Times New Roman" panose="02020603050405020304" pitchFamily="18" charset="0"/>
-              </a:rPr>
-              <a:t>(fork) </a:t>
-            </a:r>
-            <a:r>
-              <a:rPr lang="ru-RU" sz="2000" dirty="0" smtClean="0">
-                <a:latin typeface="Times New Roman" panose="02020603050405020304" pitchFamily="18" charset="0"/>
-                <a:cs typeface="Times New Roman" panose="02020603050405020304" pitchFamily="18" charset="0"/>
-              </a:rPr>
-              <a:t>несколько подзадач, рекурсивно разбивая задачу на более мелкие независимые подзадачи, пока они не станут достаточно простыми для асинхронного выполнения, и ожидать их завершения, используя метод </a:t>
-            </a:r>
-            <a:r>
-              <a:rPr lang="en-US" sz="2000" dirty="0" smtClean="0">
-                <a:latin typeface="Times New Roman" panose="02020603050405020304" pitchFamily="18" charset="0"/>
-                <a:cs typeface="Times New Roman" panose="02020603050405020304" pitchFamily="18" charset="0"/>
-              </a:rPr>
-              <a:t>join</a:t>
-            </a:r>
-            <a:r>
-              <a:rPr lang="ru-RU" sz="2000" dirty="0" smtClean="0">
-                <a:latin typeface="Times New Roman" panose="02020603050405020304" pitchFamily="18" charset="0"/>
-                <a:cs typeface="Times New Roman" panose="02020603050405020304" pitchFamily="18" charset="0"/>
-              </a:rPr>
-              <a:t>.</a:t>
-            </a:r>
-          </a:p>
-          <a:p>
-            <a:r>
-              <a:rPr lang="ru-RU" sz="2000" dirty="0" smtClean="0">
-                <a:latin typeface="Times New Roman" panose="02020603050405020304" pitchFamily="18" charset="0"/>
-                <a:cs typeface="Times New Roman" panose="02020603050405020304" pitchFamily="18" charset="0"/>
-              </a:rPr>
-              <a:t>Для обеспечения эффективного параллельного выполнения, данная инфраструктура использует пул потоков, называемый </a:t>
-            </a:r>
-            <a:r>
-              <a:rPr lang="en-US" sz="2000" dirty="0" err="1" smtClean="0">
-                <a:latin typeface="Times New Roman" panose="02020603050405020304" pitchFamily="18" charset="0"/>
-                <a:cs typeface="Times New Roman" panose="02020603050405020304" pitchFamily="18" charset="0"/>
-              </a:rPr>
-              <a:t>ForkJoinPool</a:t>
-            </a:r>
-            <a:r>
-              <a:rPr lang="ru-RU" sz="2000" dirty="0" smtClean="0">
-                <a:latin typeface="Times New Roman" panose="02020603050405020304" pitchFamily="18" charset="0"/>
-                <a:cs typeface="Times New Roman" panose="02020603050405020304" pitchFamily="18" charset="0"/>
-              </a:rPr>
-              <a:t>, который управляет потоками типа </a:t>
-            </a:r>
-            <a:r>
-              <a:rPr lang="en-US" sz="2000" dirty="0" err="1" smtClean="0">
-                <a:latin typeface="Times New Roman" panose="02020603050405020304" pitchFamily="18" charset="0"/>
-                <a:cs typeface="Times New Roman" panose="02020603050405020304" pitchFamily="18" charset="0"/>
-              </a:rPr>
-              <a:t>ForkJoinWorkerThread</a:t>
-            </a:r>
-            <a:r>
-              <a:rPr lang="ru-RU" sz="2000" dirty="0">
-                <a:latin typeface="Times New Roman" panose="02020603050405020304" pitchFamily="18" charset="0"/>
-                <a:cs typeface="Times New Roman" panose="02020603050405020304" pitchFamily="18" charset="0"/>
-              </a:rPr>
-              <a:t>.</a:t>
-            </a:r>
-            <a:r>
-              <a:rPr lang="ru-RU" sz="2000" dirty="0" smtClean="0">
-                <a:latin typeface="Times New Roman" panose="02020603050405020304" pitchFamily="18" charset="0"/>
-                <a:cs typeface="Times New Roman" panose="02020603050405020304" pitchFamily="18" charset="0"/>
-              </a:rPr>
-              <a:t> </a:t>
-            </a:r>
-          </a:p>
-          <a:p>
-            <a:r>
-              <a:rPr lang="ru-RU" sz="2000" dirty="0" smtClean="0">
-                <a:latin typeface="Times New Roman" panose="02020603050405020304" pitchFamily="18" charset="0"/>
-                <a:cs typeface="Times New Roman" panose="02020603050405020304" pitchFamily="18" charset="0"/>
-              </a:rPr>
-              <a:t>Преимущество </a:t>
-            </a:r>
-            <a:r>
-              <a:rPr lang="en-US" sz="2000" dirty="0" smtClean="0">
-                <a:latin typeface="Times New Roman" panose="02020603050405020304" pitchFamily="18" charset="0"/>
-                <a:cs typeface="Times New Roman" panose="02020603050405020304" pitchFamily="18" charset="0"/>
-              </a:rPr>
-              <a:t>fork/join </a:t>
-            </a:r>
-            <a:r>
-              <a:rPr lang="ru-RU" sz="2000" dirty="0" smtClean="0">
-                <a:latin typeface="Times New Roman" panose="02020603050405020304" pitchFamily="18" charset="0"/>
-                <a:cs typeface="Times New Roman" panose="02020603050405020304" pitchFamily="18" charset="0"/>
-              </a:rPr>
-              <a:t>состоит в том, что он не создаёт новый поток для каждой задачи или подзадачи, вместо этого реализуя алгоритм </a:t>
-            </a:r>
-            <a:r>
-              <a:rPr lang="en-US" sz="2000" dirty="0" smtClean="0">
-                <a:latin typeface="Times New Roman" panose="02020603050405020304" pitchFamily="18" charset="0"/>
-                <a:cs typeface="Times New Roman" panose="02020603050405020304" pitchFamily="18" charset="0"/>
-              </a:rPr>
-              <a:t>work stealing</a:t>
-            </a:r>
-            <a:r>
-              <a:rPr lang="ru-RU" sz="2000" dirty="0" smtClean="0">
-                <a:latin typeface="Times New Roman" panose="02020603050405020304" pitchFamily="18" charset="0"/>
-                <a:cs typeface="Times New Roman" panose="02020603050405020304" pitchFamily="18" charset="0"/>
-              </a:rPr>
-              <a:t>.</a:t>
-            </a:r>
-          </a:p>
-          <a:p>
-            <a:endParaRPr lang="ru-RU" sz="2000" dirty="0" smtClean="0">
-              <a:latin typeface="Times New Roman" panose="02020603050405020304" pitchFamily="18" charset="0"/>
-              <a:cs typeface="Times New Roman" panose="02020603050405020304" pitchFamily="18" charset="0"/>
-            </a:endParaRPr>
-          </a:p>
-        </p:txBody>
-      </p:sp>
-    </p:spTree>
-    <p:extLst>
-      <p:ext uri="{BB962C8B-B14F-4D97-AF65-F5344CB8AC3E}">
-        <p14:creationId xmlns:p14="http://schemas.microsoft.com/office/powerpoint/2010/main" val="2482080637"/>
-      </p:ext>
-    </p:extLst>
-  </p:cSld>
-  <p:clrMapOvr>
-    <a:masterClrMapping/>
-  </p:clrMapOvr>
-  <p:timing>
-    <p:tnLst>
-      <p:par>
-        <p:cTn id="1" dur="indefinite" restart="never" nodeType="tmRoot"/>
-      </p:par>
-    </p:tnLst>
-  </p:timing>
-</p:sld>
-</file>
-
-<file path=ppt/slides/slide5.xml><?xml version="1.0" encoding="utf-8"?>
-<p:sld xmlns:a="http://schemas.openxmlformats.org/drawingml/2006/main" xmlns:r="http://schemas.openxmlformats.org/officeDocument/2006/relationships" xmlns:p="http://schemas.openxmlformats.org/presentationml/2006/main">
-  <p:cSld>
-    <p:bg>
-      <p:bgPr>
-        <a:solidFill>
-          <a:schemeClr val="bg1"/>
-        </a:solidFill>
-        <a:effectLst/>
-      </p:bgPr>
-    </p:bg>
     <p:spTree>
       <p:nvGrpSpPr>
         <p:cNvPr id="1" name=""/>
@@ -6432,7 +7069,7 @@
 </p:sld>
 </file>
 
-<file path=ppt/slides/slide6.xml><?xml version="1.0" encoding="utf-8"?>
+<file path=ppt/slides/slide5.xml><?xml version="1.0" encoding="utf-8"?>
 <p:sld xmlns:a="http://schemas.openxmlformats.org/drawingml/2006/main" xmlns:r="http://schemas.openxmlformats.org/officeDocument/2006/relationships" xmlns:p="http://schemas.openxmlformats.org/presentationml/2006/main">
   <p:cSld>
     <p:spTree>
@@ -6767,6 +7404,443 @@
     <p:extLst>
       <p:ext uri="{BB962C8B-B14F-4D97-AF65-F5344CB8AC3E}">
         <p14:creationId xmlns:p14="http://schemas.microsoft.com/office/powerpoint/2010/main" val="193941059"/>
+      </p:ext>
+    </p:extLst>
+  </p:cSld>
+  <p:clrMapOvr>
+    <a:masterClrMapping/>
+  </p:clrMapOvr>
+  <p:timing>
+    <p:tnLst>
+      <p:par>
+        <p:cTn id="1" dur="indefinite" restart="never" nodeType="tmRoot"/>
+      </p:par>
+    </p:tnLst>
+  </p:timing>
+</p:sld>
+</file>
+
+<file path=ppt/slides/slide6.xml><?xml version="1.0" encoding="utf-8"?>
+<p:sld xmlns:a="http://schemas.openxmlformats.org/drawingml/2006/main" xmlns:r="http://schemas.openxmlformats.org/officeDocument/2006/relationships" xmlns:p="http://schemas.openxmlformats.org/presentationml/2006/main">
+  <p:cSld>
+    <p:spTree>
+      <p:nvGrpSpPr>
+        <p:cNvPr id="1" name=""/>
+        <p:cNvGrpSpPr/>
+        <p:nvPr/>
+      </p:nvGrpSpPr>
+      <p:grpSpPr>
+        <a:xfrm>
+          <a:off x="0" y="0"/>
+          <a:ext cx="0" cy="0"/>
+          <a:chOff x="0" y="0"/>
+          <a:chExt cx="0" cy="0"/>
+        </a:xfrm>
+      </p:grpSpPr>
+      <p:sp>
+        <p:nvSpPr>
+          <p:cNvPr id="5" name="TextBox 4"/>
+          <p:cNvSpPr txBox="1"/>
+          <p:nvPr/>
+        </p:nvSpPr>
+        <p:spPr>
+          <a:xfrm>
+            <a:off x="1" y="6273225"/>
+            <a:ext cx="12191999" cy="584775"/>
+          </a:xfrm>
+          <a:prstGeom prst="rect">
+            <a:avLst/>
+          </a:prstGeom>
+        </p:spPr>
+        <p:style>
+          <a:lnRef idx="1">
+            <a:schemeClr val="accent2"/>
+          </a:lnRef>
+          <a:fillRef idx="2">
+            <a:schemeClr val="accent2"/>
+          </a:fillRef>
+          <a:effectRef idx="1">
+            <a:schemeClr val="accent2"/>
+          </a:effectRef>
+          <a:fontRef idx="minor">
+            <a:schemeClr val="dk1"/>
+          </a:fontRef>
+        </p:style>
+        <p:txBody>
+          <a:bodyPr wrap="square" rtlCol="0">
+            <a:spAutoFit/>
+          </a:bodyPr>
+          <a:lstStyle/>
+          <a:p>
+            <a:pPr algn="ctr"/>
+            <a:endParaRPr lang="ru-RU" sz="3200" dirty="0">
+              <a:solidFill>
+                <a:schemeClr val="bg1"/>
+              </a:solidFill>
+              <a:latin typeface="Times New Roman" panose="02020603050405020304" pitchFamily="18" charset="0"/>
+              <a:cs typeface="Times New Roman" panose="02020603050405020304" pitchFamily="18" charset="0"/>
+            </a:endParaRPr>
+          </a:p>
+        </p:txBody>
+      </p:sp>
+      <p:sp>
+        <p:nvSpPr>
+          <p:cNvPr id="8" name="TextBox 7"/>
+          <p:cNvSpPr txBox="1"/>
+          <p:nvPr/>
+        </p:nvSpPr>
+        <p:spPr>
+          <a:xfrm>
+            <a:off x="0" y="-575"/>
+            <a:ext cx="12191999" cy="584775"/>
+          </a:xfrm>
+          <a:prstGeom prst="rect">
+            <a:avLst/>
+          </a:prstGeom>
+        </p:spPr>
+        <p:style>
+          <a:lnRef idx="1">
+            <a:schemeClr val="accent2"/>
+          </a:lnRef>
+          <a:fillRef idx="2">
+            <a:schemeClr val="accent2"/>
+          </a:fillRef>
+          <a:effectRef idx="1">
+            <a:schemeClr val="accent2"/>
+          </a:effectRef>
+          <a:fontRef idx="minor">
+            <a:schemeClr val="dk1"/>
+          </a:fontRef>
+        </p:style>
+        <p:txBody>
+          <a:bodyPr wrap="square" rtlCol="0">
+            <a:spAutoFit/>
+          </a:bodyPr>
+          <a:lstStyle/>
+          <a:p>
+            <a:pPr algn="ctr"/>
+            <a:r>
+              <a:rPr lang="en-US" sz="3200" b="1" dirty="0" err="1" smtClean="0">
+                <a:solidFill>
+                  <a:srgbClr val="002060"/>
+                </a:solidFill>
+                <a:latin typeface="Times New Roman" panose="02020603050405020304" pitchFamily="18" charset="0"/>
+                <a:cs typeface="Times New Roman" panose="02020603050405020304" pitchFamily="18" charset="0"/>
+              </a:rPr>
+              <a:t>ForkJoinPool</a:t>
+            </a:r>
+            <a:endParaRPr lang="ru-RU" sz="3200" b="1" dirty="0">
+              <a:solidFill>
+                <a:srgbClr val="002060"/>
+              </a:solidFill>
+              <a:latin typeface="Times New Roman" panose="02020603050405020304" pitchFamily="18" charset="0"/>
+              <a:cs typeface="Times New Roman" panose="02020603050405020304" pitchFamily="18" charset="0"/>
+            </a:endParaRPr>
+          </a:p>
+        </p:txBody>
+      </p:sp>
+      <p:sp>
+        <p:nvSpPr>
+          <p:cNvPr id="7" name="TextBox 6"/>
+          <p:cNvSpPr txBox="1"/>
+          <p:nvPr/>
+        </p:nvSpPr>
+        <p:spPr>
+          <a:xfrm>
+            <a:off x="334962" y="584200"/>
+            <a:ext cx="11522075" cy="3539430"/>
+          </a:xfrm>
+          <a:prstGeom prst="rect">
+            <a:avLst/>
+          </a:prstGeom>
+          <a:noFill/>
+        </p:spPr>
+        <p:txBody>
+          <a:bodyPr wrap="square" rtlCol="0">
+            <a:spAutoFit/>
+          </a:bodyPr>
+          <a:lstStyle/>
+          <a:p>
+            <a:pPr marL="342900" indent="-342900">
+              <a:buFontTx/>
+              <a:buChar char="-"/>
+            </a:pPr>
+            <a:r>
+              <a:rPr lang="ru-RU" sz="3200" dirty="0" smtClean="0">
+                <a:latin typeface="Times New Roman" panose="02020603050405020304" pitchFamily="18" charset="0"/>
+                <a:cs typeface="Times New Roman" panose="02020603050405020304" pitchFamily="18" charset="0"/>
+              </a:rPr>
+              <a:t>Конструктор без параметров</a:t>
+            </a:r>
+            <a:r>
+              <a:rPr lang="en-US" sz="3200" dirty="0">
+                <a:latin typeface="Times New Roman" panose="02020603050405020304" pitchFamily="18" charset="0"/>
+                <a:cs typeface="Times New Roman" panose="02020603050405020304" pitchFamily="18" charset="0"/>
+              </a:rPr>
+              <a:t> </a:t>
+            </a:r>
+            <a:r>
+              <a:rPr lang="ru-RU" sz="3200" dirty="0" smtClean="0">
+                <a:latin typeface="Times New Roman" panose="02020603050405020304" pitchFamily="18" charset="0"/>
+                <a:cs typeface="Times New Roman" panose="02020603050405020304" pitchFamily="18" charset="0"/>
+              </a:rPr>
+              <a:t>создаёт пул с параллелизмом соответствующим </a:t>
+            </a:r>
+            <a:r>
+              <a:rPr lang="en-US" sz="3200" dirty="0" smtClean="0">
+                <a:latin typeface="Times New Roman" panose="02020603050405020304" pitchFamily="18" charset="0"/>
+                <a:cs typeface="Times New Roman" panose="02020603050405020304" pitchFamily="18" charset="0"/>
+              </a:rPr>
+              <a:t>Runtime</a:t>
+            </a:r>
+            <a:endParaRPr lang="ru-RU" sz="3200" dirty="0" smtClean="0">
+              <a:latin typeface="Times New Roman" panose="02020603050405020304" pitchFamily="18" charset="0"/>
+              <a:cs typeface="Times New Roman" panose="02020603050405020304" pitchFamily="18" charset="0"/>
+            </a:endParaRPr>
+          </a:p>
+          <a:p>
+            <a:r>
+              <a:rPr lang="ru-RU" sz="3200" dirty="0">
+                <a:latin typeface="Times New Roman" panose="02020603050405020304" pitchFamily="18" charset="0"/>
+                <a:cs typeface="Times New Roman" panose="02020603050405020304" pitchFamily="18" charset="0"/>
+              </a:rPr>
+              <a:t> </a:t>
+            </a:r>
+            <a:r>
+              <a:rPr lang="ru-RU" sz="3200" dirty="0" smtClean="0">
+                <a:latin typeface="Times New Roman" panose="02020603050405020304" pitchFamily="18" charset="0"/>
+                <a:cs typeface="Times New Roman" panose="02020603050405020304" pitchFamily="18" charset="0"/>
+              </a:rPr>
+              <a:t>   </a:t>
+            </a:r>
+            <a:r>
+              <a:rPr lang="en-US" sz="3200" dirty="0" smtClean="0">
+                <a:solidFill>
+                  <a:srgbClr val="C00000"/>
+                </a:solidFill>
+                <a:latin typeface="Times New Roman" panose="02020603050405020304" pitchFamily="18" charset="0"/>
+                <a:cs typeface="Times New Roman" panose="02020603050405020304" pitchFamily="18" charset="0"/>
+              </a:rPr>
+              <a:t>public</a:t>
+            </a:r>
+            <a:r>
+              <a:rPr lang="en-US" sz="3200" dirty="0" smtClean="0">
+                <a:latin typeface="Times New Roman" panose="02020603050405020304" pitchFamily="18" charset="0"/>
+                <a:cs typeface="Times New Roman" panose="02020603050405020304" pitchFamily="18" charset="0"/>
+              </a:rPr>
+              <a:t> </a:t>
+            </a:r>
+            <a:r>
+              <a:rPr lang="en-US" sz="3200" dirty="0" err="1" smtClean="0">
+                <a:latin typeface="Times New Roman" panose="02020603050405020304" pitchFamily="18" charset="0"/>
+                <a:cs typeface="Times New Roman" panose="02020603050405020304" pitchFamily="18" charset="0"/>
+              </a:rPr>
+              <a:t>ForkJoinPool</a:t>
+            </a:r>
+            <a:r>
+              <a:rPr lang="en-US" sz="3200" dirty="0" smtClean="0">
+                <a:latin typeface="Times New Roman" panose="02020603050405020304" pitchFamily="18" charset="0"/>
+                <a:cs typeface="Times New Roman" panose="02020603050405020304" pitchFamily="18" charset="0"/>
+              </a:rPr>
+              <a:t>() {…}</a:t>
+            </a:r>
+          </a:p>
+          <a:p>
+            <a:pPr marL="457200" indent="-457200">
+              <a:buFontTx/>
+              <a:buChar char="-"/>
+            </a:pPr>
+            <a:r>
+              <a:rPr lang="ru-RU" sz="3200" dirty="0" smtClean="0">
+                <a:latin typeface="Times New Roman" panose="02020603050405020304" pitchFamily="18" charset="0"/>
+                <a:cs typeface="Times New Roman" panose="02020603050405020304" pitchFamily="18" charset="0"/>
+              </a:rPr>
+              <a:t>Конструктор, который на вход принимает значение заданного уровня параллелизма</a:t>
+            </a:r>
+          </a:p>
+          <a:p>
+            <a:r>
+              <a:rPr lang="ru-RU" sz="3200" dirty="0">
+                <a:latin typeface="Times New Roman" panose="02020603050405020304" pitchFamily="18" charset="0"/>
+                <a:cs typeface="Times New Roman" panose="02020603050405020304" pitchFamily="18" charset="0"/>
+              </a:rPr>
+              <a:t> </a:t>
+            </a:r>
+            <a:r>
+              <a:rPr lang="ru-RU" sz="3200" dirty="0" smtClean="0">
+                <a:latin typeface="Times New Roman" panose="02020603050405020304" pitchFamily="18" charset="0"/>
+                <a:cs typeface="Times New Roman" panose="02020603050405020304" pitchFamily="18" charset="0"/>
+              </a:rPr>
+              <a:t>   </a:t>
+            </a:r>
+            <a:r>
+              <a:rPr lang="en-US" sz="3200" dirty="0">
+                <a:solidFill>
+                  <a:srgbClr val="C00000"/>
+                </a:solidFill>
+                <a:latin typeface="Times New Roman" panose="02020603050405020304" pitchFamily="18" charset="0"/>
+                <a:cs typeface="Times New Roman" panose="02020603050405020304" pitchFamily="18" charset="0"/>
+              </a:rPr>
+              <a:t>public</a:t>
+            </a:r>
+            <a:r>
+              <a:rPr lang="en-US" sz="3200" dirty="0">
+                <a:latin typeface="Times New Roman" panose="02020603050405020304" pitchFamily="18" charset="0"/>
+                <a:cs typeface="Times New Roman" panose="02020603050405020304" pitchFamily="18" charset="0"/>
+              </a:rPr>
+              <a:t> </a:t>
+            </a:r>
+            <a:r>
+              <a:rPr lang="en-US" sz="3200" dirty="0" err="1" smtClean="0">
+                <a:latin typeface="Times New Roman" panose="02020603050405020304" pitchFamily="18" charset="0"/>
+                <a:cs typeface="Times New Roman" panose="02020603050405020304" pitchFamily="18" charset="0"/>
+              </a:rPr>
+              <a:t>ForkJoinPool</a:t>
+            </a:r>
+            <a:r>
+              <a:rPr lang="en-US" sz="3200" dirty="0" smtClean="0">
+                <a:latin typeface="Times New Roman" panose="02020603050405020304" pitchFamily="18" charset="0"/>
+                <a:cs typeface="Times New Roman" panose="02020603050405020304" pitchFamily="18" charset="0"/>
+              </a:rPr>
+              <a:t>(</a:t>
+            </a:r>
+            <a:r>
+              <a:rPr lang="en-US" sz="3200" dirty="0" err="1" smtClean="0">
+                <a:solidFill>
+                  <a:srgbClr val="C00000"/>
+                </a:solidFill>
+                <a:latin typeface="Times New Roman" panose="02020603050405020304" pitchFamily="18" charset="0"/>
+                <a:cs typeface="Times New Roman" panose="02020603050405020304" pitchFamily="18" charset="0"/>
+              </a:rPr>
+              <a:t>int</a:t>
+            </a:r>
+            <a:r>
+              <a:rPr lang="en-US" sz="3200" dirty="0" smtClean="0">
+                <a:latin typeface="Times New Roman" panose="02020603050405020304" pitchFamily="18" charset="0"/>
+                <a:cs typeface="Times New Roman" panose="02020603050405020304" pitchFamily="18" charset="0"/>
+              </a:rPr>
+              <a:t> parallelism) {…}</a:t>
+            </a:r>
+            <a:endParaRPr lang="ru-RU" sz="3200" dirty="0" smtClean="0">
+              <a:latin typeface="Times New Roman" panose="02020603050405020304" pitchFamily="18" charset="0"/>
+              <a:cs typeface="Times New Roman" panose="02020603050405020304" pitchFamily="18" charset="0"/>
+            </a:endParaRPr>
+          </a:p>
+          <a:p>
+            <a:endParaRPr lang="ru-RU" sz="3200" dirty="0" smtClean="0">
+              <a:latin typeface="Times New Roman" panose="02020603050405020304" pitchFamily="18" charset="0"/>
+              <a:cs typeface="Times New Roman" panose="02020603050405020304" pitchFamily="18" charset="0"/>
+            </a:endParaRPr>
+          </a:p>
+        </p:txBody>
+      </p:sp>
+      <p:sp>
+        <p:nvSpPr>
+          <p:cNvPr id="6" name="TextBox 5"/>
+          <p:cNvSpPr txBox="1"/>
+          <p:nvPr/>
+        </p:nvSpPr>
+        <p:spPr>
+          <a:xfrm>
+            <a:off x="334963" y="4123630"/>
+            <a:ext cx="11522075" cy="1569660"/>
+          </a:xfrm>
+          <a:prstGeom prst="rect">
+            <a:avLst/>
+          </a:prstGeom>
+          <a:noFill/>
+        </p:spPr>
+        <p:txBody>
+          <a:bodyPr wrap="square" rtlCol="0">
+            <a:spAutoFit/>
+          </a:bodyPr>
+          <a:lstStyle/>
+          <a:p>
+            <a:pPr marL="342900" indent="-342900">
+              <a:buFontTx/>
+              <a:buChar char="-"/>
+            </a:pPr>
+            <a:r>
+              <a:rPr lang="en-US" sz="3200" dirty="0" err="1" smtClean="0">
+                <a:latin typeface="Times New Roman" panose="02020603050405020304" pitchFamily="18" charset="0"/>
+                <a:cs typeface="Times New Roman" panose="02020603050405020304" pitchFamily="18" charset="0"/>
+              </a:rPr>
+              <a:t>commonPool</a:t>
+            </a:r>
+            <a:r>
+              <a:rPr lang="en-US" sz="3200" dirty="0" smtClean="0">
+                <a:latin typeface="Times New Roman" panose="02020603050405020304" pitchFamily="18" charset="0"/>
+                <a:cs typeface="Times New Roman" panose="02020603050405020304" pitchFamily="18" charset="0"/>
+              </a:rPr>
+              <a:t>() –</a:t>
+            </a:r>
+            <a:r>
+              <a:rPr lang="ru-RU" sz="3200" dirty="0" smtClean="0">
+                <a:latin typeface="Times New Roman" panose="02020603050405020304" pitchFamily="18" charset="0"/>
+                <a:cs typeface="Times New Roman" panose="02020603050405020304" pitchFamily="18" charset="0"/>
+              </a:rPr>
+              <a:t> это статический </a:t>
+            </a:r>
+            <a:r>
+              <a:rPr lang="ru-RU" sz="3200" dirty="0">
+                <a:latin typeface="Times New Roman" panose="02020603050405020304" pitchFamily="18" charset="0"/>
+                <a:cs typeface="Times New Roman" panose="02020603050405020304" pitchFamily="18" charset="0"/>
+              </a:rPr>
+              <a:t>метод </a:t>
+            </a:r>
+            <a:r>
+              <a:rPr lang="en-US" sz="3200" dirty="0" smtClean="0">
+                <a:latin typeface="Times New Roman" panose="02020603050405020304" pitchFamily="18" charset="0"/>
+                <a:cs typeface="Times New Roman" panose="02020603050405020304" pitchFamily="18" charset="0"/>
+              </a:rPr>
+              <a:t> </a:t>
+            </a:r>
+            <a:r>
+              <a:rPr lang="ru-RU" sz="3200" dirty="0">
+                <a:latin typeface="Times New Roman" panose="02020603050405020304" pitchFamily="18" charset="0"/>
+                <a:cs typeface="Times New Roman" panose="02020603050405020304" pitchFamily="18" charset="0"/>
+              </a:rPr>
+              <a:t>класса </a:t>
+            </a:r>
+            <a:r>
+              <a:rPr lang="en-US" sz="3200" dirty="0" err="1" smtClean="0">
+                <a:latin typeface="Times New Roman" panose="02020603050405020304" pitchFamily="18" charset="0"/>
+                <a:cs typeface="Times New Roman" panose="02020603050405020304" pitchFamily="18" charset="0"/>
+              </a:rPr>
+              <a:t>ForkJoinPool</a:t>
+            </a:r>
+            <a:r>
+              <a:rPr lang="ru-RU" sz="3200" dirty="0" smtClean="0">
+                <a:latin typeface="Times New Roman" panose="02020603050405020304" pitchFamily="18" charset="0"/>
+                <a:cs typeface="Times New Roman" panose="02020603050405020304" pitchFamily="18" charset="0"/>
+              </a:rPr>
+              <a:t>, который позволяет получить ссылку на общий пул (согласно</a:t>
+            </a:r>
+            <a:r>
+              <a:rPr lang="en-US" sz="3200" dirty="0" smtClean="0">
+                <a:latin typeface="Times New Roman" panose="02020603050405020304" pitchFamily="18" charset="0"/>
+                <a:cs typeface="Times New Roman" panose="02020603050405020304" pitchFamily="18" charset="0"/>
+              </a:rPr>
+              <a:t> Oracle </a:t>
+            </a:r>
+            <a:r>
+              <a:rPr lang="ru-RU" sz="3200" dirty="0" smtClean="0">
+                <a:latin typeface="Times New Roman" panose="02020603050405020304" pitchFamily="18" charset="0"/>
+                <a:cs typeface="Times New Roman" panose="02020603050405020304" pitchFamily="18" charset="0"/>
+              </a:rPr>
+              <a:t>документации – это снижает потребление ресурсов).</a:t>
+            </a:r>
+            <a:endParaRPr lang="en-US" sz="3200" dirty="0" smtClean="0">
+              <a:latin typeface="Times New Roman" panose="02020603050405020304" pitchFamily="18" charset="0"/>
+              <a:cs typeface="Times New Roman" panose="02020603050405020304" pitchFamily="18" charset="0"/>
+            </a:endParaRPr>
+          </a:p>
+        </p:txBody>
+      </p:sp>
+    </p:spTree>
+    <p:extLst>
+      <p:ext uri="{BB962C8B-B14F-4D97-AF65-F5344CB8AC3E}">
+        <p14:creationId xmlns:p14="http://schemas.microsoft.com/office/powerpoint/2010/main" val="1772829479"/>
       </p:ext>
     </p:extLst>
   </p:cSld>
@@ -6890,443 +7964,6 @@
                 <a:latin typeface="Times New Roman" panose="02020603050405020304" pitchFamily="18" charset="0"/>
                 <a:cs typeface="Times New Roman" panose="02020603050405020304" pitchFamily="18" charset="0"/>
               </a:rPr>
-              <a:t>ForkJoinPool</a:t>
-            </a:r>
-            <a:endParaRPr lang="ru-RU" sz="3200" b="1" dirty="0">
-              <a:solidFill>
-                <a:srgbClr val="002060"/>
-              </a:solidFill>
-              <a:latin typeface="Times New Roman" panose="02020603050405020304" pitchFamily="18" charset="0"/>
-              <a:cs typeface="Times New Roman" panose="02020603050405020304" pitchFamily="18" charset="0"/>
-            </a:endParaRPr>
-          </a:p>
-        </p:txBody>
-      </p:sp>
-      <p:sp>
-        <p:nvSpPr>
-          <p:cNvPr id="7" name="TextBox 6"/>
-          <p:cNvSpPr txBox="1"/>
-          <p:nvPr/>
-        </p:nvSpPr>
-        <p:spPr>
-          <a:xfrm>
-            <a:off x="334962" y="584200"/>
-            <a:ext cx="11522075" cy="3539430"/>
-          </a:xfrm>
-          <a:prstGeom prst="rect">
-            <a:avLst/>
-          </a:prstGeom>
-          <a:noFill/>
-        </p:spPr>
-        <p:txBody>
-          <a:bodyPr wrap="square" rtlCol="0">
-            <a:spAutoFit/>
-          </a:bodyPr>
-          <a:lstStyle/>
-          <a:p>
-            <a:pPr marL="342900" indent="-342900">
-              <a:buFontTx/>
-              <a:buChar char="-"/>
-            </a:pPr>
-            <a:r>
-              <a:rPr lang="ru-RU" sz="3200" dirty="0" smtClean="0">
-                <a:latin typeface="Times New Roman" panose="02020603050405020304" pitchFamily="18" charset="0"/>
-                <a:cs typeface="Times New Roman" panose="02020603050405020304" pitchFamily="18" charset="0"/>
-              </a:rPr>
-              <a:t>Конструктор без параметров</a:t>
-            </a:r>
-            <a:r>
-              <a:rPr lang="en-US" sz="3200" dirty="0">
-                <a:latin typeface="Times New Roman" panose="02020603050405020304" pitchFamily="18" charset="0"/>
-                <a:cs typeface="Times New Roman" panose="02020603050405020304" pitchFamily="18" charset="0"/>
-              </a:rPr>
-              <a:t> </a:t>
-            </a:r>
-            <a:r>
-              <a:rPr lang="ru-RU" sz="3200" dirty="0" smtClean="0">
-                <a:latin typeface="Times New Roman" panose="02020603050405020304" pitchFamily="18" charset="0"/>
-                <a:cs typeface="Times New Roman" panose="02020603050405020304" pitchFamily="18" charset="0"/>
-              </a:rPr>
-              <a:t>создаёт пул с параллелизмом соответствующим </a:t>
-            </a:r>
-            <a:r>
-              <a:rPr lang="en-US" sz="3200" dirty="0" smtClean="0">
-                <a:latin typeface="Times New Roman" panose="02020603050405020304" pitchFamily="18" charset="0"/>
-                <a:cs typeface="Times New Roman" panose="02020603050405020304" pitchFamily="18" charset="0"/>
-              </a:rPr>
-              <a:t>Runtime</a:t>
-            </a:r>
-            <a:endParaRPr lang="ru-RU" sz="3200" dirty="0" smtClean="0">
-              <a:latin typeface="Times New Roman" panose="02020603050405020304" pitchFamily="18" charset="0"/>
-              <a:cs typeface="Times New Roman" panose="02020603050405020304" pitchFamily="18" charset="0"/>
-            </a:endParaRPr>
-          </a:p>
-          <a:p>
-            <a:r>
-              <a:rPr lang="ru-RU" sz="3200" dirty="0">
-                <a:latin typeface="Times New Roman" panose="02020603050405020304" pitchFamily="18" charset="0"/>
-                <a:cs typeface="Times New Roman" panose="02020603050405020304" pitchFamily="18" charset="0"/>
-              </a:rPr>
-              <a:t> </a:t>
-            </a:r>
-            <a:r>
-              <a:rPr lang="ru-RU" sz="3200" dirty="0" smtClean="0">
-                <a:latin typeface="Times New Roman" panose="02020603050405020304" pitchFamily="18" charset="0"/>
-                <a:cs typeface="Times New Roman" panose="02020603050405020304" pitchFamily="18" charset="0"/>
-              </a:rPr>
-              <a:t>   </a:t>
-            </a:r>
-            <a:r>
-              <a:rPr lang="en-US" sz="3200" dirty="0" smtClean="0">
-                <a:solidFill>
-                  <a:srgbClr val="C00000"/>
-                </a:solidFill>
-                <a:latin typeface="Times New Roman" panose="02020603050405020304" pitchFamily="18" charset="0"/>
-                <a:cs typeface="Times New Roman" panose="02020603050405020304" pitchFamily="18" charset="0"/>
-              </a:rPr>
-              <a:t>public</a:t>
-            </a:r>
-            <a:r>
-              <a:rPr lang="en-US" sz="3200" dirty="0" smtClean="0">
-                <a:latin typeface="Times New Roman" panose="02020603050405020304" pitchFamily="18" charset="0"/>
-                <a:cs typeface="Times New Roman" panose="02020603050405020304" pitchFamily="18" charset="0"/>
-              </a:rPr>
-              <a:t> </a:t>
-            </a:r>
-            <a:r>
-              <a:rPr lang="en-US" sz="3200" dirty="0" err="1" smtClean="0">
-                <a:latin typeface="Times New Roman" panose="02020603050405020304" pitchFamily="18" charset="0"/>
-                <a:cs typeface="Times New Roman" panose="02020603050405020304" pitchFamily="18" charset="0"/>
-              </a:rPr>
-              <a:t>ForkJoinPool</a:t>
-            </a:r>
-            <a:r>
-              <a:rPr lang="en-US" sz="3200" dirty="0" smtClean="0">
-                <a:latin typeface="Times New Roman" panose="02020603050405020304" pitchFamily="18" charset="0"/>
-                <a:cs typeface="Times New Roman" panose="02020603050405020304" pitchFamily="18" charset="0"/>
-              </a:rPr>
-              <a:t>() {…}</a:t>
-            </a:r>
-          </a:p>
-          <a:p>
-            <a:pPr marL="457200" indent="-457200">
-              <a:buFontTx/>
-              <a:buChar char="-"/>
-            </a:pPr>
-            <a:r>
-              <a:rPr lang="ru-RU" sz="3200" dirty="0" smtClean="0">
-                <a:latin typeface="Times New Roman" panose="02020603050405020304" pitchFamily="18" charset="0"/>
-                <a:cs typeface="Times New Roman" panose="02020603050405020304" pitchFamily="18" charset="0"/>
-              </a:rPr>
-              <a:t>Конструктор, который на вход принимает значение заданного уровня параллелизма</a:t>
-            </a:r>
-          </a:p>
-          <a:p>
-            <a:r>
-              <a:rPr lang="ru-RU" sz="3200" dirty="0">
-                <a:latin typeface="Times New Roman" panose="02020603050405020304" pitchFamily="18" charset="0"/>
-                <a:cs typeface="Times New Roman" panose="02020603050405020304" pitchFamily="18" charset="0"/>
-              </a:rPr>
-              <a:t> </a:t>
-            </a:r>
-            <a:r>
-              <a:rPr lang="ru-RU" sz="3200" dirty="0" smtClean="0">
-                <a:latin typeface="Times New Roman" panose="02020603050405020304" pitchFamily="18" charset="0"/>
-                <a:cs typeface="Times New Roman" panose="02020603050405020304" pitchFamily="18" charset="0"/>
-              </a:rPr>
-              <a:t>   </a:t>
-            </a:r>
-            <a:r>
-              <a:rPr lang="en-US" sz="3200" dirty="0">
-                <a:solidFill>
-                  <a:srgbClr val="C00000"/>
-                </a:solidFill>
-                <a:latin typeface="Times New Roman" panose="02020603050405020304" pitchFamily="18" charset="0"/>
-                <a:cs typeface="Times New Roman" panose="02020603050405020304" pitchFamily="18" charset="0"/>
-              </a:rPr>
-              <a:t>public</a:t>
-            </a:r>
-            <a:r>
-              <a:rPr lang="en-US" sz="3200" dirty="0">
-                <a:latin typeface="Times New Roman" panose="02020603050405020304" pitchFamily="18" charset="0"/>
-                <a:cs typeface="Times New Roman" panose="02020603050405020304" pitchFamily="18" charset="0"/>
-              </a:rPr>
-              <a:t> </a:t>
-            </a:r>
-            <a:r>
-              <a:rPr lang="en-US" sz="3200" dirty="0" err="1" smtClean="0">
-                <a:latin typeface="Times New Roman" panose="02020603050405020304" pitchFamily="18" charset="0"/>
-                <a:cs typeface="Times New Roman" panose="02020603050405020304" pitchFamily="18" charset="0"/>
-              </a:rPr>
-              <a:t>ForkJoinPool</a:t>
-            </a:r>
-            <a:r>
-              <a:rPr lang="en-US" sz="3200" dirty="0" smtClean="0">
-                <a:latin typeface="Times New Roman" panose="02020603050405020304" pitchFamily="18" charset="0"/>
-                <a:cs typeface="Times New Roman" panose="02020603050405020304" pitchFamily="18" charset="0"/>
-              </a:rPr>
-              <a:t>(</a:t>
-            </a:r>
-            <a:r>
-              <a:rPr lang="en-US" sz="3200" dirty="0" err="1" smtClean="0">
-                <a:solidFill>
-                  <a:srgbClr val="C00000"/>
-                </a:solidFill>
-                <a:latin typeface="Times New Roman" panose="02020603050405020304" pitchFamily="18" charset="0"/>
-                <a:cs typeface="Times New Roman" panose="02020603050405020304" pitchFamily="18" charset="0"/>
-              </a:rPr>
-              <a:t>int</a:t>
-            </a:r>
-            <a:r>
-              <a:rPr lang="en-US" sz="3200" dirty="0" smtClean="0">
-                <a:latin typeface="Times New Roman" panose="02020603050405020304" pitchFamily="18" charset="0"/>
-                <a:cs typeface="Times New Roman" panose="02020603050405020304" pitchFamily="18" charset="0"/>
-              </a:rPr>
-              <a:t> parallelism) {…}</a:t>
-            </a:r>
-            <a:endParaRPr lang="ru-RU" sz="3200" dirty="0" smtClean="0">
-              <a:latin typeface="Times New Roman" panose="02020603050405020304" pitchFamily="18" charset="0"/>
-              <a:cs typeface="Times New Roman" panose="02020603050405020304" pitchFamily="18" charset="0"/>
-            </a:endParaRPr>
-          </a:p>
-          <a:p>
-            <a:endParaRPr lang="ru-RU" sz="3200" dirty="0" smtClean="0">
-              <a:latin typeface="Times New Roman" panose="02020603050405020304" pitchFamily="18" charset="0"/>
-              <a:cs typeface="Times New Roman" panose="02020603050405020304" pitchFamily="18" charset="0"/>
-            </a:endParaRPr>
-          </a:p>
-        </p:txBody>
-      </p:sp>
-      <p:sp>
-        <p:nvSpPr>
-          <p:cNvPr id="6" name="TextBox 5"/>
-          <p:cNvSpPr txBox="1"/>
-          <p:nvPr/>
-        </p:nvSpPr>
-        <p:spPr>
-          <a:xfrm>
-            <a:off x="334963" y="4123630"/>
-            <a:ext cx="11522075" cy="1569660"/>
-          </a:xfrm>
-          <a:prstGeom prst="rect">
-            <a:avLst/>
-          </a:prstGeom>
-          <a:noFill/>
-        </p:spPr>
-        <p:txBody>
-          <a:bodyPr wrap="square" rtlCol="0">
-            <a:spAutoFit/>
-          </a:bodyPr>
-          <a:lstStyle/>
-          <a:p>
-            <a:pPr marL="342900" indent="-342900">
-              <a:buFontTx/>
-              <a:buChar char="-"/>
-            </a:pPr>
-            <a:r>
-              <a:rPr lang="en-US" sz="3200" dirty="0" err="1" smtClean="0">
-                <a:latin typeface="Times New Roman" panose="02020603050405020304" pitchFamily="18" charset="0"/>
-                <a:cs typeface="Times New Roman" panose="02020603050405020304" pitchFamily="18" charset="0"/>
-              </a:rPr>
-              <a:t>commonPool</a:t>
-            </a:r>
-            <a:r>
-              <a:rPr lang="en-US" sz="3200" dirty="0" smtClean="0">
-                <a:latin typeface="Times New Roman" panose="02020603050405020304" pitchFamily="18" charset="0"/>
-                <a:cs typeface="Times New Roman" panose="02020603050405020304" pitchFamily="18" charset="0"/>
-              </a:rPr>
-              <a:t>() –</a:t>
-            </a:r>
-            <a:r>
-              <a:rPr lang="ru-RU" sz="3200" dirty="0" smtClean="0">
-                <a:latin typeface="Times New Roman" panose="02020603050405020304" pitchFamily="18" charset="0"/>
-                <a:cs typeface="Times New Roman" panose="02020603050405020304" pitchFamily="18" charset="0"/>
-              </a:rPr>
-              <a:t> это статический </a:t>
-            </a:r>
-            <a:r>
-              <a:rPr lang="ru-RU" sz="3200" dirty="0">
-                <a:latin typeface="Times New Roman" panose="02020603050405020304" pitchFamily="18" charset="0"/>
-                <a:cs typeface="Times New Roman" panose="02020603050405020304" pitchFamily="18" charset="0"/>
-              </a:rPr>
-              <a:t>метод </a:t>
-            </a:r>
-            <a:r>
-              <a:rPr lang="en-US" sz="3200" dirty="0" smtClean="0">
-                <a:latin typeface="Times New Roman" panose="02020603050405020304" pitchFamily="18" charset="0"/>
-                <a:cs typeface="Times New Roman" panose="02020603050405020304" pitchFamily="18" charset="0"/>
-              </a:rPr>
-              <a:t> </a:t>
-            </a:r>
-            <a:r>
-              <a:rPr lang="ru-RU" sz="3200" dirty="0">
-                <a:latin typeface="Times New Roman" panose="02020603050405020304" pitchFamily="18" charset="0"/>
-                <a:cs typeface="Times New Roman" panose="02020603050405020304" pitchFamily="18" charset="0"/>
-              </a:rPr>
-              <a:t>класса </a:t>
-            </a:r>
-            <a:r>
-              <a:rPr lang="en-US" sz="3200" dirty="0" err="1" smtClean="0">
-                <a:latin typeface="Times New Roman" panose="02020603050405020304" pitchFamily="18" charset="0"/>
-                <a:cs typeface="Times New Roman" panose="02020603050405020304" pitchFamily="18" charset="0"/>
-              </a:rPr>
-              <a:t>ForkJoinPool</a:t>
-            </a:r>
-            <a:r>
-              <a:rPr lang="ru-RU" sz="3200" dirty="0" smtClean="0">
-                <a:latin typeface="Times New Roman" panose="02020603050405020304" pitchFamily="18" charset="0"/>
-                <a:cs typeface="Times New Roman" panose="02020603050405020304" pitchFamily="18" charset="0"/>
-              </a:rPr>
-              <a:t>, который позволяет получить ссылку на общий пул (согласно</a:t>
-            </a:r>
-            <a:r>
-              <a:rPr lang="en-US" sz="3200" dirty="0" smtClean="0">
-                <a:latin typeface="Times New Roman" panose="02020603050405020304" pitchFamily="18" charset="0"/>
-                <a:cs typeface="Times New Roman" panose="02020603050405020304" pitchFamily="18" charset="0"/>
-              </a:rPr>
-              <a:t> Oracle </a:t>
-            </a:r>
-            <a:r>
-              <a:rPr lang="ru-RU" sz="3200" dirty="0" smtClean="0">
-                <a:latin typeface="Times New Roman" panose="02020603050405020304" pitchFamily="18" charset="0"/>
-                <a:cs typeface="Times New Roman" panose="02020603050405020304" pitchFamily="18" charset="0"/>
-              </a:rPr>
-              <a:t>документации – это снижает потребление ресурсов).</a:t>
-            </a:r>
-            <a:endParaRPr lang="en-US" sz="3200" dirty="0" smtClean="0">
-              <a:latin typeface="Times New Roman" panose="02020603050405020304" pitchFamily="18" charset="0"/>
-              <a:cs typeface="Times New Roman" panose="02020603050405020304" pitchFamily="18" charset="0"/>
-            </a:endParaRPr>
-          </a:p>
-        </p:txBody>
-      </p:sp>
-    </p:spTree>
-    <p:extLst>
-      <p:ext uri="{BB962C8B-B14F-4D97-AF65-F5344CB8AC3E}">
-        <p14:creationId xmlns:p14="http://schemas.microsoft.com/office/powerpoint/2010/main" val="1772829479"/>
-      </p:ext>
-    </p:extLst>
-  </p:cSld>
-  <p:clrMapOvr>
-    <a:masterClrMapping/>
-  </p:clrMapOvr>
-  <p:timing>
-    <p:tnLst>
-      <p:par>
-        <p:cTn id="1" dur="indefinite" restart="never" nodeType="tmRoot"/>
-      </p:par>
-    </p:tnLst>
-  </p:timing>
-</p:sld>
-</file>
-
-<file path=ppt/slides/slide8.xml><?xml version="1.0" encoding="utf-8"?>
-<p:sld xmlns:a="http://schemas.openxmlformats.org/drawingml/2006/main" xmlns:r="http://schemas.openxmlformats.org/officeDocument/2006/relationships" xmlns:p="http://schemas.openxmlformats.org/presentationml/2006/main">
-  <p:cSld>
-    <p:spTree>
-      <p:nvGrpSpPr>
-        <p:cNvPr id="1" name=""/>
-        <p:cNvGrpSpPr/>
-        <p:nvPr/>
-      </p:nvGrpSpPr>
-      <p:grpSpPr>
-        <a:xfrm>
-          <a:off x="0" y="0"/>
-          <a:ext cx="0" cy="0"/>
-          <a:chOff x="0" y="0"/>
-          <a:chExt cx="0" cy="0"/>
-        </a:xfrm>
-      </p:grpSpPr>
-      <p:sp>
-        <p:nvSpPr>
-          <p:cNvPr id="5" name="TextBox 4"/>
-          <p:cNvSpPr txBox="1"/>
-          <p:nvPr/>
-        </p:nvSpPr>
-        <p:spPr>
-          <a:xfrm>
-            <a:off x="1" y="6273225"/>
-            <a:ext cx="12191999" cy="584775"/>
-          </a:xfrm>
-          <a:prstGeom prst="rect">
-            <a:avLst/>
-          </a:prstGeom>
-        </p:spPr>
-        <p:style>
-          <a:lnRef idx="1">
-            <a:schemeClr val="accent2"/>
-          </a:lnRef>
-          <a:fillRef idx="2">
-            <a:schemeClr val="accent2"/>
-          </a:fillRef>
-          <a:effectRef idx="1">
-            <a:schemeClr val="accent2"/>
-          </a:effectRef>
-          <a:fontRef idx="minor">
-            <a:schemeClr val="dk1"/>
-          </a:fontRef>
-        </p:style>
-        <p:txBody>
-          <a:bodyPr wrap="square" rtlCol="0">
-            <a:spAutoFit/>
-          </a:bodyPr>
-          <a:lstStyle/>
-          <a:p>
-            <a:pPr algn="ctr"/>
-            <a:endParaRPr lang="ru-RU" sz="3200" dirty="0">
-              <a:solidFill>
-                <a:schemeClr val="bg1"/>
-              </a:solidFill>
-              <a:latin typeface="Times New Roman" panose="02020603050405020304" pitchFamily="18" charset="0"/>
-              <a:cs typeface="Times New Roman" panose="02020603050405020304" pitchFamily="18" charset="0"/>
-            </a:endParaRPr>
-          </a:p>
-        </p:txBody>
-      </p:sp>
-      <p:sp>
-        <p:nvSpPr>
-          <p:cNvPr id="8" name="TextBox 7"/>
-          <p:cNvSpPr txBox="1"/>
-          <p:nvPr/>
-        </p:nvSpPr>
-        <p:spPr>
-          <a:xfrm>
-            <a:off x="0" y="-575"/>
-            <a:ext cx="12191999" cy="584775"/>
-          </a:xfrm>
-          <a:prstGeom prst="rect">
-            <a:avLst/>
-          </a:prstGeom>
-        </p:spPr>
-        <p:style>
-          <a:lnRef idx="1">
-            <a:schemeClr val="accent2"/>
-          </a:lnRef>
-          <a:fillRef idx="2">
-            <a:schemeClr val="accent2"/>
-          </a:fillRef>
-          <a:effectRef idx="1">
-            <a:schemeClr val="accent2"/>
-          </a:effectRef>
-          <a:fontRef idx="minor">
-            <a:schemeClr val="dk1"/>
-          </a:fontRef>
-        </p:style>
-        <p:txBody>
-          <a:bodyPr wrap="square" rtlCol="0">
-            <a:spAutoFit/>
-          </a:bodyPr>
-          <a:lstStyle/>
-          <a:p>
-            <a:pPr algn="ctr"/>
-            <a:r>
-              <a:rPr lang="en-US" sz="3200" b="1" dirty="0" err="1" smtClean="0">
-                <a:solidFill>
-                  <a:srgbClr val="002060"/>
-                </a:solidFill>
-                <a:latin typeface="Times New Roman" panose="02020603050405020304" pitchFamily="18" charset="0"/>
-                <a:cs typeface="Times New Roman" panose="02020603050405020304" pitchFamily="18" charset="0"/>
-              </a:rPr>
               <a:t>ForkJoinTask</a:t>
             </a:r>
             <a:endParaRPr lang="ru-RU" sz="3200" b="1" dirty="0">
@@ -7749,17 +8386,9 @@
 </p:sld>
 </file>
 
-<file path=ppt/slides/slide9.xml><?xml version="1.0" encoding="utf-8"?>
+<file path=ppt/slides/slide8.xml><?xml version="1.0" encoding="utf-8"?>
 <p:sld xmlns:a="http://schemas.openxmlformats.org/drawingml/2006/main" xmlns:r="http://schemas.openxmlformats.org/officeDocument/2006/relationships" xmlns:p="http://schemas.openxmlformats.org/presentationml/2006/main">
   <p:cSld>
-    <p:bg>
-      <p:bgPr>
-        <a:solidFill>
-          <a:schemeClr val="bg1"/>
-        </a:solidFill>
-        <a:effectLst/>
-      </p:bgPr>
-    </p:bg>
     <p:spTree>
       <p:nvGrpSpPr>
         <p:cNvPr id="1" name=""/>
@@ -8060,6 +8689,407 @@
     <p:extLst>
       <p:ext uri="{BB962C8B-B14F-4D97-AF65-F5344CB8AC3E}">
         <p14:creationId xmlns:p14="http://schemas.microsoft.com/office/powerpoint/2010/main" val="3759752719"/>
+      </p:ext>
+    </p:extLst>
+  </p:cSld>
+  <p:clrMapOvr>
+    <a:masterClrMapping/>
+  </p:clrMapOvr>
+  <p:timing>
+    <p:tnLst>
+      <p:par>
+        <p:cTn id="1" dur="indefinite" restart="never" nodeType="tmRoot"/>
+      </p:par>
+    </p:tnLst>
+  </p:timing>
+</p:sld>
+</file>
+
+<file path=ppt/slides/slide9.xml><?xml version="1.0" encoding="utf-8"?>
+<p:sld xmlns:a="http://schemas.openxmlformats.org/drawingml/2006/main" xmlns:r="http://schemas.openxmlformats.org/officeDocument/2006/relationships" xmlns:p="http://schemas.openxmlformats.org/presentationml/2006/main">
+  <p:cSld>
+    <p:spTree>
+      <p:nvGrpSpPr>
+        <p:cNvPr id="1" name=""/>
+        <p:cNvGrpSpPr/>
+        <p:nvPr/>
+      </p:nvGrpSpPr>
+      <p:grpSpPr>
+        <a:xfrm>
+          <a:off x="0" y="0"/>
+          <a:ext cx="0" cy="0"/>
+          <a:chOff x="0" y="0"/>
+          <a:chExt cx="0" cy="0"/>
+        </a:xfrm>
+      </p:grpSpPr>
+      <p:sp>
+        <p:nvSpPr>
+          <p:cNvPr id="5" name="TextBox 4"/>
+          <p:cNvSpPr txBox="1"/>
+          <p:nvPr/>
+        </p:nvSpPr>
+        <p:spPr>
+          <a:xfrm>
+            <a:off x="1" y="6273225"/>
+            <a:ext cx="12191999" cy="584775"/>
+          </a:xfrm>
+          <a:prstGeom prst="rect">
+            <a:avLst/>
+          </a:prstGeom>
+        </p:spPr>
+        <p:style>
+          <a:lnRef idx="1">
+            <a:schemeClr val="accent2"/>
+          </a:lnRef>
+          <a:fillRef idx="2">
+            <a:schemeClr val="accent2"/>
+          </a:fillRef>
+          <a:effectRef idx="1">
+            <a:schemeClr val="accent2"/>
+          </a:effectRef>
+          <a:fontRef idx="minor">
+            <a:schemeClr val="dk1"/>
+          </a:fontRef>
+        </p:style>
+        <p:txBody>
+          <a:bodyPr wrap="square" rtlCol="0">
+            <a:spAutoFit/>
+          </a:bodyPr>
+          <a:lstStyle/>
+          <a:p>
+            <a:pPr algn="ctr"/>
+            <a:endParaRPr lang="ru-RU" sz="3200" dirty="0">
+              <a:solidFill>
+                <a:schemeClr val="bg1"/>
+              </a:solidFill>
+              <a:latin typeface="Times New Roman" panose="02020603050405020304" pitchFamily="18" charset="0"/>
+              <a:cs typeface="Times New Roman" panose="02020603050405020304" pitchFamily="18" charset="0"/>
+            </a:endParaRPr>
+          </a:p>
+        </p:txBody>
+      </p:sp>
+      <p:sp>
+        <p:nvSpPr>
+          <p:cNvPr id="8" name="TextBox 7"/>
+          <p:cNvSpPr txBox="1"/>
+          <p:nvPr/>
+        </p:nvSpPr>
+        <p:spPr>
+          <a:xfrm>
+            <a:off x="0" y="-575"/>
+            <a:ext cx="12191999" cy="584775"/>
+          </a:xfrm>
+          <a:prstGeom prst="rect">
+            <a:avLst/>
+          </a:prstGeom>
+        </p:spPr>
+        <p:style>
+          <a:lnRef idx="1">
+            <a:schemeClr val="accent2"/>
+          </a:lnRef>
+          <a:fillRef idx="2">
+            <a:schemeClr val="accent2"/>
+          </a:fillRef>
+          <a:effectRef idx="1">
+            <a:schemeClr val="accent2"/>
+          </a:effectRef>
+          <a:fontRef idx="minor">
+            <a:schemeClr val="dk1"/>
+          </a:fontRef>
+        </p:style>
+        <p:txBody>
+          <a:bodyPr wrap="square" rtlCol="0">
+            <a:spAutoFit/>
+          </a:bodyPr>
+          <a:lstStyle/>
+          <a:p>
+            <a:pPr algn="ctr"/>
+            <a:r>
+              <a:rPr lang="ru-RU" sz="3200" b="1" dirty="0" smtClean="0">
+                <a:solidFill>
+                  <a:srgbClr val="002060"/>
+                </a:solidFill>
+                <a:latin typeface="Times New Roman" panose="02020603050405020304" pitchFamily="18" charset="0"/>
+                <a:cs typeface="Times New Roman" panose="02020603050405020304" pitchFamily="18" charset="0"/>
+              </a:rPr>
+              <a:t>Метод </a:t>
+            </a:r>
+            <a:r>
+              <a:rPr lang="en-US" sz="3200" b="1" dirty="0" smtClean="0">
+                <a:solidFill>
+                  <a:srgbClr val="002060"/>
+                </a:solidFill>
+                <a:latin typeface="Times New Roman" panose="02020603050405020304" pitchFamily="18" charset="0"/>
+                <a:cs typeface="Times New Roman" panose="02020603050405020304" pitchFamily="18" charset="0"/>
+              </a:rPr>
+              <a:t>compute()</a:t>
+            </a:r>
+            <a:endParaRPr lang="ru-RU" sz="3200" b="1" dirty="0">
+              <a:solidFill>
+                <a:srgbClr val="002060"/>
+              </a:solidFill>
+              <a:latin typeface="Times New Roman" panose="02020603050405020304" pitchFamily="18" charset="0"/>
+              <a:cs typeface="Times New Roman" panose="02020603050405020304" pitchFamily="18" charset="0"/>
+            </a:endParaRPr>
+          </a:p>
+        </p:txBody>
+      </p:sp>
+      <p:sp>
+        <p:nvSpPr>
+          <p:cNvPr id="6" name="TextBox 5"/>
+          <p:cNvSpPr txBox="1"/>
+          <p:nvPr/>
+        </p:nvSpPr>
+        <p:spPr>
+          <a:xfrm>
+            <a:off x="334961" y="584200"/>
+            <a:ext cx="11522075" cy="5509200"/>
+          </a:xfrm>
+          <a:prstGeom prst="rect">
+            <a:avLst/>
+          </a:prstGeom>
+          <a:noFill/>
+        </p:spPr>
+        <p:txBody>
+          <a:bodyPr wrap="square" rtlCol="0">
+            <a:spAutoFit/>
+          </a:bodyPr>
+          <a:lstStyle/>
+          <a:p>
+            <a:r>
+              <a:rPr lang="ru-RU" sz="3200" dirty="0" smtClean="0">
+                <a:latin typeface="Times New Roman" panose="02020603050405020304" pitchFamily="18" charset="0"/>
+                <a:cs typeface="Times New Roman" panose="02020603050405020304" pitchFamily="18" charset="0"/>
+              </a:rPr>
+              <a:t>В данном методе реализуется алгоритм решения задачи, а также разделение задачи на подзадачи</a:t>
+            </a:r>
+          </a:p>
+          <a:p>
+            <a:r>
+              <a:rPr lang="ru-RU" sz="3200" dirty="0">
+                <a:latin typeface="Times New Roman" panose="02020603050405020304" pitchFamily="18" charset="0"/>
+                <a:cs typeface="Times New Roman" panose="02020603050405020304" pitchFamily="18" charset="0"/>
+              </a:rPr>
+              <a:t>	</a:t>
+            </a:r>
+            <a:r>
+              <a:rPr lang="en-US" sz="3200" dirty="0" smtClean="0">
+                <a:latin typeface="Times New Roman" panose="02020603050405020304" pitchFamily="18" charset="0"/>
+                <a:cs typeface="Times New Roman" panose="02020603050405020304" pitchFamily="18" charset="0"/>
+              </a:rPr>
+              <a:t>@Override</a:t>
+            </a:r>
+          </a:p>
+          <a:p>
+            <a:r>
+              <a:rPr lang="en-US" sz="3200" dirty="0">
+                <a:latin typeface="Times New Roman" panose="02020603050405020304" pitchFamily="18" charset="0"/>
+                <a:cs typeface="Times New Roman" panose="02020603050405020304" pitchFamily="18" charset="0"/>
+              </a:rPr>
+              <a:t>	</a:t>
+            </a:r>
+            <a:r>
+              <a:rPr lang="en-US" sz="3200" dirty="0">
+                <a:solidFill>
+                  <a:srgbClr val="C00000"/>
+                </a:solidFill>
+                <a:latin typeface="Times New Roman" panose="02020603050405020304" pitchFamily="18" charset="0"/>
+                <a:cs typeface="Times New Roman" panose="02020603050405020304" pitchFamily="18" charset="0"/>
+              </a:rPr>
+              <a:t>p</a:t>
+            </a:r>
+            <a:r>
+              <a:rPr lang="en-US" sz="3200" dirty="0" smtClean="0">
+                <a:solidFill>
+                  <a:srgbClr val="C00000"/>
+                </a:solidFill>
+                <a:latin typeface="Times New Roman" panose="02020603050405020304" pitchFamily="18" charset="0"/>
+                <a:cs typeface="Times New Roman" panose="02020603050405020304" pitchFamily="18" charset="0"/>
+              </a:rPr>
+              <a:t>rotected</a:t>
+            </a:r>
+            <a:r>
+              <a:rPr lang="en-US" sz="3200" dirty="0" smtClean="0">
+                <a:latin typeface="Times New Roman" panose="02020603050405020304" pitchFamily="18" charset="0"/>
+                <a:cs typeface="Times New Roman" panose="02020603050405020304" pitchFamily="18" charset="0"/>
+              </a:rPr>
+              <a:t> V compute() {</a:t>
+            </a:r>
+          </a:p>
+          <a:p>
+            <a:r>
+              <a:rPr lang="en-US" sz="3200" dirty="0">
+                <a:latin typeface="Times New Roman" panose="02020603050405020304" pitchFamily="18" charset="0"/>
+                <a:cs typeface="Times New Roman" panose="02020603050405020304" pitchFamily="18" charset="0"/>
+              </a:rPr>
+              <a:t>	</a:t>
+            </a:r>
+            <a:r>
+              <a:rPr lang="en-US" sz="3200" dirty="0" smtClean="0">
+                <a:latin typeface="Times New Roman" panose="02020603050405020304" pitchFamily="18" charset="0"/>
+                <a:cs typeface="Times New Roman" panose="02020603050405020304" pitchFamily="18" charset="0"/>
+              </a:rPr>
+              <a:t>	</a:t>
+            </a:r>
+            <a:r>
+              <a:rPr lang="en-US" sz="3200" dirty="0" smtClean="0">
+                <a:solidFill>
+                  <a:srgbClr val="C00000"/>
+                </a:solidFill>
+                <a:latin typeface="Times New Roman" panose="02020603050405020304" pitchFamily="18" charset="0"/>
+                <a:cs typeface="Times New Roman" panose="02020603050405020304" pitchFamily="18" charset="0"/>
+              </a:rPr>
+              <a:t>if(</a:t>
+            </a:r>
+            <a:r>
+              <a:rPr lang="ru-RU" sz="3200" dirty="0" smtClean="0">
+                <a:latin typeface="Times New Roman" panose="02020603050405020304" pitchFamily="18" charset="0"/>
+                <a:cs typeface="Times New Roman" panose="02020603050405020304" pitchFamily="18" charset="0"/>
+              </a:rPr>
+              <a:t>проверка для </a:t>
+            </a:r>
+            <a:r>
+              <a:rPr lang="en-US" sz="3200" dirty="0" smtClean="0">
+                <a:latin typeface="Times New Roman" panose="02020603050405020304" pitchFamily="18" charset="0"/>
+                <a:cs typeface="Times New Roman" panose="02020603050405020304" pitchFamily="18" charset="0"/>
+              </a:rPr>
+              <a:t>threshold) {</a:t>
+            </a:r>
+          </a:p>
+          <a:p>
+            <a:r>
+              <a:rPr lang="en-US" sz="3200" dirty="0">
+                <a:latin typeface="Times New Roman" panose="02020603050405020304" pitchFamily="18" charset="0"/>
+                <a:cs typeface="Times New Roman" panose="02020603050405020304" pitchFamily="18" charset="0"/>
+              </a:rPr>
+              <a:t>	</a:t>
+            </a:r>
+            <a:r>
+              <a:rPr lang="en-US" sz="3200" dirty="0" smtClean="0">
+                <a:latin typeface="Times New Roman" panose="02020603050405020304" pitchFamily="18" charset="0"/>
+                <a:cs typeface="Times New Roman" panose="02020603050405020304" pitchFamily="18" charset="0"/>
+              </a:rPr>
+              <a:t>		/* </a:t>
+            </a:r>
+            <a:r>
+              <a:rPr lang="ru-RU" sz="3200" dirty="0" smtClean="0">
+                <a:latin typeface="Times New Roman" panose="02020603050405020304" pitchFamily="18" charset="0"/>
+                <a:cs typeface="Times New Roman" panose="02020603050405020304" pitchFamily="18" charset="0"/>
+              </a:rPr>
+              <a:t>алгоритм решения задачи (подзадачи)</a:t>
+            </a:r>
+            <a:r>
+              <a:rPr lang="en-US" sz="3200" dirty="0" smtClean="0">
+                <a:latin typeface="Times New Roman" panose="02020603050405020304" pitchFamily="18" charset="0"/>
+                <a:cs typeface="Times New Roman" panose="02020603050405020304" pitchFamily="18" charset="0"/>
+              </a:rPr>
+              <a:t> */</a:t>
+            </a:r>
+          </a:p>
+          <a:p>
+            <a:r>
+              <a:rPr lang="en-US" sz="3200" dirty="0" smtClean="0">
+                <a:latin typeface="Times New Roman" panose="02020603050405020304" pitchFamily="18" charset="0"/>
+                <a:cs typeface="Times New Roman" panose="02020603050405020304" pitchFamily="18" charset="0"/>
+              </a:rPr>
+              <a:t>		}</a:t>
+            </a:r>
+            <a:r>
+              <a:rPr lang="ru-RU" sz="3200" dirty="0" smtClean="0">
+                <a:latin typeface="Times New Roman" panose="02020603050405020304" pitchFamily="18" charset="0"/>
+                <a:cs typeface="Times New Roman" panose="02020603050405020304" pitchFamily="18" charset="0"/>
+              </a:rPr>
+              <a:t> </a:t>
+            </a:r>
+            <a:r>
+              <a:rPr lang="en-US" sz="3200" dirty="0" smtClean="0">
+                <a:solidFill>
+                  <a:srgbClr val="C00000"/>
+                </a:solidFill>
+                <a:latin typeface="Times New Roman" panose="02020603050405020304" pitchFamily="18" charset="0"/>
+                <a:cs typeface="Times New Roman" panose="02020603050405020304" pitchFamily="18" charset="0"/>
+              </a:rPr>
+              <a:t>else</a:t>
+            </a:r>
+            <a:r>
+              <a:rPr lang="en-US" sz="3200" dirty="0" smtClean="0">
+                <a:latin typeface="Times New Roman" panose="02020603050405020304" pitchFamily="18" charset="0"/>
+                <a:cs typeface="Times New Roman" panose="02020603050405020304" pitchFamily="18" charset="0"/>
+              </a:rPr>
+              <a:t> {</a:t>
+            </a:r>
+          </a:p>
+          <a:p>
+            <a:r>
+              <a:rPr lang="en-US" sz="3200" dirty="0">
+                <a:latin typeface="Times New Roman" panose="02020603050405020304" pitchFamily="18" charset="0"/>
+                <a:cs typeface="Times New Roman" panose="02020603050405020304" pitchFamily="18" charset="0"/>
+              </a:rPr>
+              <a:t>	</a:t>
+            </a:r>
+            <a:r>
+              <a:rPr lang="en-US" sz="3200" dirty="0" smtClean="0">
+                <a:latin typeface="Times New Roman" panose="02020603050405020304" pitchFamily="18" charset="0"/>
+                <a:cs typeface="Times New Roman" panose="02020603050405020304" pitchFamily="18" charset="0"/>
+              </a:rPr>
+              <a:t>		/* </a:t>
+            </a:r>
+            <a:r>
+              <a:rPr lang="ru-RU" sz="3200" dirty="0" smtClean="0">
+                <a:latin typeface="Times New Roman" panose="02020603050405020304" pitchFamily="18" charset="0"/>
+                <a:cs typeface="Times New Roman" panose="02020603050405020304" pitchFamily="18" charset="0"/>
+              </a:rPr>
+              <a:t>алгоритм деления задачи на подзадачи</a:t>
+            </a:r>
+            <a:r>
+              <a:rPr lang="en-US" sz="3200" dirty="0" smtClean="0">
+                <a:latin typeface="Times New Roman" panose="02020603050405020304" pitchFamily="18" charset="0"/>
+                <a:cs typeface="Times New Roman" panose="02020603050405020304" pitchFamily="18" charset="0"/>
+              </a:rPr>
+              <a:t> */</a:t>
+            </a:r>
+          </a:p>
+          <a:p>
+            <a:r>
+              <a:rPr lang="en-US" sz="3200" dirty="0">
+                <a:latin typeface="Times New Roman" panose="02020603050405020304" pitchFamily="18" charset="0"/>
+                <a:cs typeface="Times New Roman" panose="02020603050405020304" pitchFamily="18" charset="0"/>
+              </a:rPr>
+              <a:t>	</a:t>
+            </a:r>
+            <a:r>
+              <a:rPr lang="en-US" sz="3200" dirty="0" smtClean="0">
+                <a:latin typeface="Times New Roman" panose="02020603050405020304" pitchFamily="18" charset="0"/>
+                <a:cs typeface="Times New Roman" panose="02020603050405020304" pitchFamily="18" charset="0"/>
+              </a:rPr>
+              <a:t>	}</a:t>
+            </a:r>
+          </a:p>
+          <a:p>
+            <a:r>
+              <a:rPr lang="en-US" sz="3200" dirty="0" smtClean="0">
+                <a:latin typeface="Times New Roman" panose="02020603050405020304" pitchFamily="18" charset="0"/>
+                <a:cs typeface="Times New Roman" panose="02020603050405020304" pitchFamily="18" charset="0"/>
+              </a:rPr>
+              <a:t>	}</a:t>
+            </a:r>
+            <a:endParaRPr lang="ru-RU" sz="3200" dirty="0" smtClean="0">
+              <a:latin typeface="Times New Roman" panose="02020603050405020304" pitchFamily="18" charset="0"/>
+              <a:cs typeface="Times New Roman" panose="02020603050405020304" pitchFamily="18" charset="0"/>
+            </a:endParaRPr>
+          </a:p>
+          <a:p>
+            <a:endParaRPr lang="ru-RU" sz="3200" b="1" dirty="0" smtClean="0">
+              <a:latin typeface="Times New Roman" panose="02020603050405020304" pitchFamily="18" charset="0"/>
+              <a:cs typeface="Times New Roman" panose="02020603050405020304" pitchFamily="18" charset="0"/>
+            </a:endParaRPr>
+          </a:p>
+        </p:txBody>
+      </p:sp>
+    </p:spTree>
+    <p:extLst>
+      <p:ext uri="{BB962C8B-B14F-4D97-AF65-F5344CB8AC3E}">
+        <p14:creationId xmlns:p14="http://schemas.microsoft.com/office/powerpoint/2010/main" val="1222231830"/>
       </p:ext>
     </p:extLst>
   </p:cSld>

</xml_diff>